<commit_message>
updated s1 w u2-dataset tag
</commit_message>
<xml_diff>
--- a/scenario1/rm/T101389-s1-v20210928.pptx
+++ b/scenario1/rm/T101389-s1-v20210928.pptx
@@ -5,7 +5,7 @@
     <p:sldMasterId id="2147483648" r:id="rId1"/>
   </p:sldMasterIdLst>
   <p:notesMasterIdLst>
-    <p:notesMasterId r:id="rId32"/>
+    <p:notesMasterId r:id="rId29"/>
   </p:notesMasterIdLst>
   <p:sldIdLst>
     <p:sldId id="256" r:id="rId2"/>
@@ -19,25 +19,22 @@
     <p:sldId id="261" r:id="rId10"/>
     <p:sldId id="271" r:id="rId11"/>
     <p:sldId id="272" r:id="rId12"/>
-    <p:sldId id="288" r:id="rId13"/>
-    <p:sldId id="273" r:id="rId14"/>
+    <p:sldId id="273" r:id="rId13"/>
+    <p:sldId id="288" r:id="rId14"/>
     <p:sldId id="274" r:id="rId15"/>
-    <p:sldId id="268" r:id="rId16"/>
-    <p:sldId id="269" r:id="rId17"/>
-    <p:sldId id="266" r:id="rId18"/>
-    <p:sldId id="270" r:id="rId19"/>
-    <p:sldId id="275" r:id="rId20"/>
-    <p:sldId id="276" r:id="rId21"/>
-    <p:sldId id="277" r:id="rId22"/>
-    <p:sldId id="278" r:id="rId23"/>
-    <p:sldId id="286" r:id="rId24"/>
-    <p:sldId id="258" r:id="rId25"/>
-    <p:sldId id="283" r:id="rId26"/>
-    <p:sldId id="284" r:id="rId27"/>
-    <p:sldId id="285" r:id="rId28"/>
-    <p:sldId id="287" r:id="rId29"/>
-    <p:sldId id="280" r:id="rId30"/>
-    <p:sldId id="279" r:id="rId31"/>
+    <p:sldId id="291" r:id="rId16"/>
+    <p:sldId id="292" r:id="rId17"/>
+    <p:sldId id="293" r:id="rId18"/>
+    <p:sldId id="294" r:id="rId19"/>
+    <p:sldId id="278" r:id="rId20"/>
+    <p:sldId id="286" r:id="rId21"/>
+    <p:sldId id="258" r:id="rId22"/>
+    <p:sldId id="283" r:id="rId23"/>
+    <p:sldId id="284" r:id="rId24"/>
+    <p:sldId id="285" r:id="rId25"/>
+    <p:sldId id="287" r:id="rId26"/>
+    <p:sldId id="280" r:id="rId27"/>
+    <p:sldId id="279" r:id="rId28"/>
   </p:sldIdLst>
   <p:sldSz cx="12192000" cy="6858000"/>
   <p:notesSz cx="6858000" cy="9144000"/>
@@ -577,7 +574,7 @@
 </p:notes>
 </file>
 
-<file path=ppt/notesSlides/notesSlide2.xml><?xml version="1.0" encoding="utf-8"?>
+<file path=ppt/notesSlides/notesSlide10.xml><?xml version="1.0" encoding="utf-8"?>
 <p:notes xmlns:a="http://schemas.openxmlformats.org/drawingml/2006/main" xmlns:r="http://schemas.openxmlformats.org/officeDocument/2006/relationships" xmlns:p="http://schemas.openxmlformats.org/presentationml/2006/main">
   <p:cSld>
     <p:spTree>
@@ -621,7 +618,10 @@
           <a:bodyPr/>
           <a:lstStyle/>
           <a:p>
-            <a:endParaRPr lang="en-US" dirty="0"/>
+            <a:r>
+              <a:rPr lang="en-US" dirty="0"/>
+              <a:t>E1016404-10-autotag-policy-added</a:t>
+            </a:r>
           </a:p>
         </p:txBody>
       </p:sp>
@@ -640,18 +640,78 @@
           <a:bodyPr/>
           <a:lstStyle/>
           <a:p>
-            <a:fld id="{7FE50167-558C-4D4E-A218-0F44CB45BE81}" type="slidenum">
-              <a:rPr lang="en-US" smtClean="0"/>
-              <a:t>10</a:t>
+            <a:pPr marL="0" marR="0" lvl="0" indent="0" algn="r" defTabSz="914400" rtl="0" eaLnBrk="1" fontAlgn="auto" latinLnBrk="0" hangingPunct="1">
+              <a:lnSpc>
+                <a:spcPct val="100000"/>
+              </a:lnSpc>
+              <a:spcBef>
+                <a:spcPts val="0"/>
+              </a:spcBef>
+              <a:spcAft>
+                <a:spcPts val="0"/>
+              </a:spcAft>
+              <a:buClrTx/>
+              <a:buSzTx/>
+              <a:buFontTx/>
+              <a:buNone/>
+              <a:tabLst/>
+              <a:defRPr/>
+            </a:pPr>
+            <a:fld id="{C37639F4-367D-4C6D-AF3D-3EF385521B21}" type="slidenum">
+              <a:rPr kumimoji="0" lang="en-US" sz="1200" b="0" i="0" u="none" strike="noStrike" kern="1200" cap="none" spc="0" normalizeH="0" baseline="0" noProof="0" smtClean="0">
+                <a:ln>
+                  <a:noFill/>
+                </a:ln>
+                <a:solidFill>
+                  <a:prstClr val="black"/>
+                </a:solidFill>
+                <a:effectLst/>
+                <a:uLnTx/>
+                <a:uFillTx/>
+                <a:latin typeface="Calibri" panose="020F0502020204030204"/>
+                <a:ea typeface="+mn-ea"/>
+                <a:cs typeface="+mn-cs"/>
+              </a:rPr>
+              <a:pPr marL="0" marR="0" lvl="0" indent="0" algn="r" defTabSz="914400" rtl="0" eaLnBrk="1" fontAlgn="auto" latinLnBrk="0" hangingPunct="1">
+                <a:lnSpc>
+                  <a:spcPct val="100000"/>
+                </a:lnSpc>
+                <a:spcBef>
+                  <a:spcPts val="0"/>
+                </a:spcBef>
+                <a:spcAft>
+                  <a:spcPts val="0"/>
+                </a:spcAft>
+                <a:buClrTx/>
+                <a:buSzTx/>
+                <a:buFontTx/>
+                <a:buNone/>
+                <a:tabLst/>
+                <a:defRPr/>
+              </a:pPr>
+              <a:t>21</a:t>
             </a:fld>
-            <a:endParaRPr lang="en-US"/>
+            <a:endParaRPr kumimoji="0" lang="en-US" sz="1200" b="0" i="0" u="none" strike="noStrike" kern="1200" cap="none" spc="0" normalizeH="0" baseline="0" noProof="0">
+              <a:ln>
+                <a:noFill/>
+              </a:ln>
+              <a:solidFill>
+                <a:prstClr val="black"/>
+              </a:solidFill>
+              <a:effectLst/>
+              <a:uLnTx/>
+              <a:uFillTx/>
+              <a:latin typeface="Calibri" panose="020F0502020204030204"/>
+              <a:ea typeface="+mn-ea"/>
+              <a:cs typeface="+mn-cs"/>
+            </a:endParaRPr>
           </a:p>
         </p:txBody>
       </p:sp>
     </p:spTree>
     <p:extLst>
       <p:ext uri="{BB962C8B-B14F-4D97-AF65-F5344CB8AC3E}">
-        <p14:creationId xmlns:p14="http://schemas.microsoft.com/office/powerpoint/2010/main" val="1586352207"/>
+        <p14:creationId xmlns:p14="http://schemas.microsoft.com/office/powerpoint/2010/main" val="1298336431"/>
       </p:ext>
     </p:extLst>
   </p:cSld>
@@ -661,7 +721,7 @@
 </p:notes>
 </file>
 
-<file path=ppt/notesSlides/notesSlide3.xml><?xml version="1.0" encoding="utf-8"?>
+<file path=ppt/notesSlides/notesSlide11.xml><?xml version="1.0" encoding="utf-8"?>
 <p:notes xmlns:a="http://schemas.openxmlformats.org/drawingml/2006/main" xmlns:r="http://schemas.openxmlformats.org/officeDocument/2006/relationships" xmlns:p="http://schemas.openxmlformats.org/presentationml/2006/main">
   <p:cSld>
     <p:spTree>
@@ -705,7 +765,10 @@
           <a:bodyPr/>
           <a:lstStyle/>
           <a:p>
-            <a:endParaRPr lang="en-US" dirty="0"/>
+            <a:r>
+              <a:rPr lang="en-US" dirty="0"/>
+              <a:t>E1016404-20-autotag-policy-run-completed</a:t>
+            </a:r>
           </a:p>
         </p:txBody>
       </p:sp>
@@ -724,18 +787,78 @@
           <a:bodyPr/>
           <a:lstStyle/>
           <a:p>
-            <a:fld id="{7FE50167-558C-4D4E-A218-0F44CB45BE81}" type="slidenum">
-              <a:rPr lang="en-US" smtClean="0"/>
-              <a:t>11</a:t>
+            <a:pPr marL="0" marR="0" lvl="0" indent="0" algn="r" defTabSz="914400" rtl="0" eaLnBrk="1" fontAlgn="auto" latinLnBrk="0" hangingPunct="1">
+              <a:lnSpc>
+                <a:spcPct val="100000"/>
+              </a:lnSpc>
+              <a:spcBef>
+                <a:spcPts val="0"/>
+              </a:spcBef>
+              <a:spcAft>
+                <a:spcPts val="0"/>
+              </a:spcAft>
+              <a:buClrTx/>
+              <a:buSzTx/>
+              <a:buFontTx/>
+              <a:buNone/>
+              <a:tabLst/>
+              <a:defRPr/>
+            </a:pPr>
+            <a:fld id="{C37639F4-367D-4C6D-AF3D-3EF385521B21}" type="slidenum">
+              <a:rPr kumimoji="0" lang="en-US" sz="1200" b="0" i="0" u="none" strike="noStrike" kern="1200" cap="none" spc="0" normalizeH="0" baseline="0" noProof="0" smtClean="0">
+                <a:ln>
+                  <a:noFill/>
+                </a:ln>
+                <a:solidFill>
+                  <a:prstClr val="black"/>
+                </a:solidFill>
+                <a:effectLst/>
+                <a:uLnTx/>
+                <a:uFillTx/>
+                <a:latin typeface="Calibri" panose="020F0502020204030204"/>
+                <a:ea typeface="+mn-ea"/>
+                <a:cs typeface="+mn-cs"/>
+              </a:rPr>
+              <a:pPr marL="0" marR="0" lvl="0" indent="0" algn="r" defTabSz="914400" rtl="0" eaLnBrk="1" fontAlgn="auto" latinLnBrk="0" hangingPunct="1">
+                <a:lnSpc>
+                  <a:spcPct val="100000"/>
+                </a:lnSpc>
+                <a:spcBef>
+                  <a:spcPts val="0"/>
+                </a:spcBef>
+                <a:spcAft>
+                  <a:spcPts val="0"/>
+                </a:spcAft>
+                <a:buClrTx/>
+                <a:buSzTx/>
+                <a:buFontTx/>
+                <a:buNone/>
+                <a:tabLst/>
+                <a:defRPr/>
+              </a:pPr>
+              <a:t>22</a:t>
             </a:fld>
-            <a:endParaRPr lang="en-US"/>
+            <a:endParaRPr kumimoji="0" lang="en-US" sz="1200" b="0" i="0" u="none" strike="noStrike" kern="1200" cap="none" spc="0" normalizeH="0" baseline="0" noProof="0">
+              <a:ln>
+                <a:noFill/>
+              </a:ln>
+              <a:solidFill>
+                <a:prstClr val="black"/>
+              </a:solidFill>
+              <a:effectLst/>
+              <a:uLnTx/>
+              <a:uFillTx/>
+              <a:latin typeface="Calibri" panose="020F0502020204030204"/>
+              <a:ea typeface="+mn-ea"/>
+              <a:cs typeface="+mn-cs"/>
+            </a:endParaRPr>
           </a:p>
         </p:txBody>
       </p:sp>
     </p:spTree>
     <p:extLst>
       <p:ext uri="{BB962C8B-B14F-4D97-AF65-F5344CB8AC3E}">
-        <p14:creationId xmlns:p14="http://schemas.microsoft.com/office/powerpoint/2010/main" val="2857468987"/>
+        <p14:creationId xmlns:p14="http://schemas.microsoft.com/office/powerpoint/2010/main" val="3273163760"/>
       </p:ext>
     </p:extLst>
   </p:cSld>
@@ -745,7 +868,7 @@
 </p:notes>
 </file>
 
-<file path=ppt/notesSlides/notesSlide4.xml><?xml version="1.0" encoding="utf-8"?>
+<file path=ppt/notesSlides/notesSlide12.xml><?xml version="1.0" encoding="utf-8"?>
 <p:notes xmlns:a="http://schemas.openxmlformats.org/drawingml/2006/main" xmlns:r="http://schemas.openxmlformats.org/officeDocument/2006/relationships" xmlns:p="http://schemas.openxmlformats.org/presentationml/2006/main">
   <p:cSld>
     <p:spTree>
@@ -789,7 +912,27 @@
           <a:bodyPr/>
           <a:lstStyle/>
           <a:p>
-            <a:endParaRPr lang="en-US" dirty="0"/>
+            <a:pPr marL="0" marR="0" lvl="0" indent="0" algn="l" defTabSz="914400" rtl="0" eaLnBrk="1" fontAlgn="auto" latinLnBrk="0" hangingPunct="1">
+              <a:lnSpc>
+                <a:spcPct val="100000"/>
+              </a:lnSpc>
+              <a:spcBef>
+                <a:spcPts val="0"/>
+              </a:spcBef>
+              <a:spcAft>
+                <a:spcPts val="0"/>
+              </a:spcAft>
+              <a:buClrTx/>
+              <a:buSzTx/>
+              <a:buFontTx/>
+              <a:buNone/>
+              <a:tabLst/>
+              <a:defRPr/>
+            </a:pPr>
+            <a:r>
+              <a:rPr lang="en-US" dirty="0"/>
+              <a:t>E1016404-30-query-for-new-dataset</a:t>
+            </a:r>
           </a:p>
         </p:txBody>
       </p:sp>
@@ -808,18 +951,78 @@
           <a:bodyPr/>
           <a:lstStyle/>
           <a:p>
-            <a:fld id="{7FE50167-558C-4D4E-A218-0F44CB45BE81}" type="slidenum">
-              <a:rPr lang="en-US" smtClean="0"/>
-              <a:t>13</a:t>
+            <a:pPr marL="0" marR="0" lvl="0" indent="0" algn="r" defTabSz="914400" rtl="0" eaLnBrk="1" fontAlgn="auto" latinLnBrk="0" hangingPunct="1">
+              <a:lnSpc>
+                <a:spcPct val="100000"/>
+              </a:lnSpc>
+              <a:spcBef>
+                <a:spcPts val="0"/>
+              </a:spcBef>
+              <a:spcAft>
+                <a:spcPts val="0"/>
+              </a:spcAft>
+              <a:buClrTx/>
+              <a:buSzTx/>
+              <a:buFontTx/>
+              <a:buNone/>
+              <a:tabLst/>
+              <a:defRPr/>
+            </a:pPr>
+            <a:fld id="{C37639F4-367D-4C6D-AF3D-3EF385521B21}" type="slidenum">
+              <a:rPr kumimoji="0" lang="en-US" sz="1200" b="0" i="0" u="none" strike="noStrike" kern="1200" cap="none" spc="0" normalizeH="0" baseline="0" noProof="0" smtClean="0">
+                <a:ln>
+                  <a:noFill/>
+                </a:ln>
+                <a:solidFill>
+                  <a:prstClr val="black"/>
+                </a:solidFill>
+                <a:effectLst/>
+                <a:uLnTx/>
+                <a:uFillTx/>
+                <a:latin typeface="Calibri" panose="020F0502020204030204"/>
+                <a:ea typeface="+mn-ea"/>
+                <a:cs typeface="+mn-cs"/>
+              </a:rPr>
+              <a:pPr marL="0" marR="0" lvl="0" indent="0" algn="r" defTabSz="914400" rtl="0" eaLnBrk="1" fontAlgn="auto" latinLnBrk="0" hangingPunct="1">
+                <a:lnSpc>
+                  <a:spcPct val="100000"/>
+                </a:lnSpc>
+                <a:spcBef>
+                  <a:spcPts val="0"/>
+                </a:spcBef>
+                <a:spcAft>
+                  <a:spcPts val="0"/>
+                </a:spcAft>
+                <a:buClrTx/>
+                <a:buSzTx/>
+                <a:buFontTx/>
+                <a:buNone/>
+                <a:tabLst/>
+                <a:defRPr/>
+              </a:pPr>
+              <a:t>23</a:t>
             </a:fld>
-            <a:endParaRPr lang="en-US"/>
+            <a:endParaRPr kumimoji="0" lang="en-US" sz="1200" b="0" i="0" u="none" strike="noStrike" kern="1200" cap="none" spc="0" normalizeH="0" baseline="0" noProof="0">
+              <a:ln>
+                <a:noFill/>
+              </a:ln>
+              <a:solidFill>
+                <a:prstClr val="black"/>
+              </a:solidFill>
+              <a:effectLst/>
+              <a:uLnTx/>
+              <a:uFillTx/>
+              <a:latin typeface="Calibri" panose="020F0502020204030204"/>
+              <a:ea typeface="+mn-ea"/>
+              <a:cs typeface="+mn-cs"/>
+            </a:endParaRPr>
           </a:p>
         </p:txBody>
       </p:sp>
     </p:spTree>
     <p:extLst>
       <p:ext uri="{BB962C8B-B14F-4D97-AF65-F5344CB8AC3E}">
-        <p14:creationId xmlns:p14="http://schemas.microsoft.com/office/powerpoint/2010/main" val="3375901916"/>
+        <p14:creationId xmlns:p14="http://schemas.microsoft.com/office/powerpoint/2010/main" val="2482503278"/>
       </p:ext>
     </p:extLst>
   </p:cSld>
@@ -829,7 +1032,7 @@
 </p:notes>
 </file>
 
-<file path=ppt/notesSlides/notesSlide5.xml><?xml version="1.0" encoding="utf-8"?>
+<file path=ppt/notesSlides/notesSlide13.xml><?xml version="1.0" encoding="utf-8"?>
 <p:notes xmlns:a="http://schemas.openxmlformats.org/drawingml/2006/main" xmlns:r="http://schemas.openxmlformats.org/officeDocument/2006/relationships" xmlns:p="http://schemas.openxmlformats.org/presentationml/2006/main">
   <p:cSld>
     <p:spTree>
@@ -873,93 +1076,26 @@
           <a:bodyPr/>
           <a:lstStyle/>
           <a:p>
-            <a:endParaRPr lang="en-US" dirty="0"/>
-          </a:p>
-        </p:txBody>
-      </p:sp>
-      <p:sp>
-        <p:nvSpPr>
-          <p:cNvPr id="4" name="Slide Number Placeholder 3"/>
-          <p:cNvSpPr>
-            <a:spLocks noGrp="1"/>
-          </p:cNvSpPr>
-          <p:nvPr>
-            <p:ph type="sldNum" sz="quarter" idx="5"/>
-          </p:nvPr>
-        </p:nvSpPr>
-        <p:spPr/>
-        <p:txBody>
-          <a:bodyPr/>
-          <a:lstStyle/>
-          <a:p>
-            <a:fld id="{7FE50167-558C-4D4E-A218-0F44CB45BE81}" type="slidenum">
-              <a:rPr lang="en-US" smtClean="0"/>
-              <a:t>14</a:t>
-            </a:fld>
-            <a:endParaRPr lang="en-US"/>
-          </a:p>
-        </p:txBody>
-      </p:sp>
-    </p:spTree>
-    <p:extLst>
-      <p:ext uri="{BB962C8B-B14F-4D97-AF65-F5344CB8AC3E}">
-        <p14:creationId xmlns:p14="http://schemas.microsoft.com/office/powerpoint/2010/main" val="1723431945"/>
-      </p:ext>
-    </p:extLst>
-  </p:cSld>
-  <p:clrMapOvr>
-    <a:masterClrMapping/>
-  </p:clrMapOvr>
-</p:notes>
-</file>
-
-<file path=ppt/notesSlides/notesSlide6.xml><?xml version="1.0" encoding="utf-8"?>
-<p:notes xmlns:a="http://schemas.openxmlformats.org/drawingml/2006/main" xmlns:r="http://schemas.openxmlformats.org/officeDocument/2006/relationships" xmlns:p="http://schemas.openxmlformats.org/presentationml/2006/main">
-  <p:cSld>
-    <p:spTree>
-      <p:nvGrpSpPr>
-        <p:cNvPr id="1" name=""/>
-        <p:cNvGrpSpPr/>
-        <p:nvPr/>
-      </p:nvGrpSpPr>
-      <p:grpSpPr>
-        <a:xfrm>
-          <a:off x="0" y="0"/>
-          <a:ext cx="0" cy="0"/>
-          <a:chOff x="0" y="0"/>
-          <a:chExt cx="0" cy="0"/>
-        </a:xfrm>
-      </p:grpSpPr>
-      <p:sp>
-        <p:nvSpPr>
-          <p:cNvPr id="2" name="Slide Image Placeholder 1"/>
-          <p:cNvSpPr>
-            <a:spLocks noGrp="1" noRot="1" noChangeAspect="1"/>
-          </p:cNvSpPr>
-          <p:nvPr>
-            <p:ph type="sldImg"/>
-          </p:nvPr>
-        </p:nvSpPr>
-        <p:spPr/>
-      </p:sp>
-      <p:sp>
-        <p:nvSpPr>
-          <p:cNvPr id="3" name="Notes Placeholder 2"/>
-          <p:cNvSpPr>
-            <a:spLocks noGrp="1"/>
-          </p:cNvSpPr>
-          <p:nvPr>
-            <p:ph type="body" idx="1"/>
-          </p:nvPr>
-        </p:nvSpPr>
-        <p:spPr/>
-        <p:txBody>
-          <a:bodyPr/>
-          <a:lstStyle/>
-          <a:p>
+            <a:pPr marL="0" marR="0" lvl="0" indent="0" algn="l" defTabSz="914400" rtl="0" eaLnBrk="1" fontAlgn="auto" latinLnBrk="0" hangingPunct="1">
+              <a:lnSpc>
+                <a:spcPct val="100000"/>
+              </a:lnSpc>
+              <a:spcBef>
+                <a:spcPts val="0"/>
+              </a:spcBef>
+              <a:spcAft>
+                <a:spcPts val="0"/>
+              </a:spcAft>
+              <a:buClrTx/>
+              <a:buSzTx/>
+              <a:buFontTx/>
+              <a:buNone/>
+              <a:tabLst/>
+              <a:defRPr/>
+            </a:pPr>
             <a:r>
               <a:rPr lang="en-US" dirty="0"/>
-              <a:t>E1016404-10-autotag-policy-added</a:t>
+              <a:t>E1016404-40-new-dataset-w-calculated-tag</a:t>
             </a:r>
           </a:p>
         </p:txBody>
@@ -1050,7 +1186,430 @@
     </p:spTree>
     <p:extLst>
       <p:ext uri="{BB962C8B-B14F-4D97-AF65-F5344CB8AC3E}">
-        <p14:creationId xmlns:p14="http://schemas.microsoft.com/office/powerpoint/2010/main" val="1298336431"/>
+        <p14:creationId xmlns:p14="http://schemas.microsoft.com/office/powerpoint/2010/main" val="4023775969"/>
+      </p:ext>
+    </p:extLst>
+  </p:cSld>
+  <p:clrMapOvr>
+    <a:masterClrMapping/>
+  </p:clrMapOvr>
+</p:notes>
+</file>
+
+<file path=ppt/notesSlides/notesSlide2.xml><?xml version="1.0" encoding="utf-8"?>
+<p:notes xmlns:a="http://schemas.openxmlformats.org/drawingml/2006/main" xmlns:r="http://schemas.openxmlformats.org/officeDocument/2006/relationships" xmlns:p="http://schemas.openxmlformats.org/presentationml/2006/main">
+  <p:cSld>
+    <p:spTree>
+      <p:nvGrpSpPr>
+        <p:cNvPr id="1" name=""/>
+        <p:cNvGrpSpPr/>
+        <p:nvPr/>
+      </p:nvGrpSpPr>
+      <p:grpSpPr>
+        <a:xfrm>
+          <a:off x="0" y="0"/>
+          <a:ext cx="0" cy="0"/>
+          <a:chOff x="0" y="0"/>
+          <a:chExt cx="0" cy="0"/>
+        </a:xfrm>
+      </p:grpSpPr>
+      <p:sp>
+        <p:nvSpPr>
+          <p:cNvPr id="2" name="Slide Image Placeholder 1"/>
+          <p:cNvSpPr>
+            <a:spLocks noGrp="1" noRot="1" noChangeAspect="1"/>
+          </p:cNvSpPr>
+          <p:nvPr>
+            <p:ph type="sldImg"/>
+          </p:nvPr>
+        </p:nvSpPr>
+        <p:spPr/>
+      </p:sp>
+      <p:sp>
+        <p:nvSpPr>
+          <p:cNvPr id="3" name="Notes Placeholder 2"/>
+          <p:cNvSpPr>
+            <a:spLocks noGrp="1"/>
+          </p:cNvSpPr>
+          <p:nvPr>
+            <p:ph type="body" idx="1"/>
+          </p:nvPr>
+        </p:nvSpPr>
+        <p:spPr/>
+        <p:txBody>
+          <a:bodyPr/>
+          <a:lstStyle/>
+          <a:p>
+            <a:endParaRPr lang="en-US" dirty="0"/>
+          </a:p>
+        </p:txBody>
+      </p:sp>
+      <p:sp>
+        <p:nvSpPr>
+          <p:cNvPr id="4" name="Slide Number Placeholder 3"/>
+          <p:cNvSpPr>
+            <a:spLocks noGrp="1"/>
+          </p:cNvSpPr>
+          <p:nvPr>
+            <p:ph type="sldNum" sz="quarter" idx="5"/>
+          </p:nvPr>
+        </p:nvSpPr>
+        <p:spPr/>
+        <p:txBody>
+          <a:bodyPr/>
+          <a:lstStyle/>
+          <a:p>
+            <a:fld id="{7FE50167-558C-4D4E-A218-0F44CB45BE81}" type="slidenum">
+              <a:rPr lang="en-US" smtClean="0"/>
+              <a:t>10</a:t>
+            </a:fld>
+            <a:endParaRPr lang="en-US"/>
+          </a:p>
+        </p:txBody>
+      </p:sp>
+    </p:spTree>
+    <p:extLst>
+      <p:ext uri="{BB962C8B-B14F-4D97-AF65-F5344CB8AC3E}">
+        <p14:creationId xmlns:p14="http://schemas.microsoft.com/office/powerpoint/2010/main" val="1586352207"/>
+      </p:ext>
+    </p:extLst>
+  </p:cSld>
+  <p:clrMapOvr>
+    <a:masterClrMapping/>
+  </p:clrMapOvr>
+</p:notes>
+</file>
+
+<file path=ppt/notesSlides/notesSlide3.xml><?xml version="1.0" encoding="utf-8"?>
+<p:notes xmlns:a="http://schemas.openxmlformats.org/drawingml/2006/main" xmlns:r="http://schemas.openxmlformats.org/officeDocument/2006/relationships" xmlns:p="http://schemas.openxmlformats.org/presentationml/2006/main">
+  <p:cSld>
+    <p:spTree>
+      <p:nvGrpSpPr>
+        <p:cNvPr id="1" name=""/>
+        <p:cNvGrpSpPr/>
+        <p:nvPr/>
+      </p:nvGrpSpPr>
+      <p:grpSpPr>
+        <a:xfrm>
+          <a:off x="0" y="0"/>
+          <a:ext cx="0" cy="0"/>
+          <a:chOff x="0" y="0"/>
+          <a:chExt cx="0" cy="0"/>
+        </a:xfrm>
+      </p:grpSpPr>
+      <p:sp>
+        <p:nvSpPr>
+          <p:cNvPr id="2" name="Slide Image Placeholder 1"/>
+          <p:cNvSpPr>
+            <a:spLocks noGrp="1" noRot="1" noChangeAspect="1"/>
+          </p:cNvSpPr>
+          <p:nvPr>
+            <p:ph type="sldImg"/>
+          </p:nvPr>
+        </p:nvSpPr>
+        <p:spPr/>
+      </p:sp>
+      <p:sp>
+        <p:nvSpPr>
+          <p:cNvPr id="3" name="Notes Placeholder 2"/>
+          <p:cNvSpPr>
+            <a:spLocks noGrp="1"/>
+          </p:cNvSpPr>
+          <p:nvPr>
+            <p:ph type="body" idx="1"/>
+          </p:nvPr>
+        </p:nvSpPr>
+        <p:spPr/>
+        <p:txBody>
+          <a:bodyPr/>
+          <a:lstStyle/>
+          <a:p>
+            <a:endParaRPr lang="en-US" dirty="0"/>
+          </a:p>
+        </p:txBody>
+      </p:sp>
+      <p:sp>
+        <p:nvSpPr>
+          <p:cNvPr id="4" name="Slide Number Placeholder 3"/>
+          <p:cNvSpPr>
+            <a:spLocks noGrp="1"/>
+          </p:cNvSpPr>
+          <p:nvPr>
+            <p:ph type="sldNum" sz="quarter" idx="5"/>
+          </p:nvPr>
+        </p:nvSpPr>
+        <p:spPr/>
+        <p:txBody>
+          <a:bodyPr/>
+          <a:lstStyle/>
+          <a:p>
+            <a:fld id="{7FE50167-558C-4D4E-A218-0F44CB45BE81}" type="slidenum">
+              <a:rPr lang="en-US" smtClean="0"/>
+              <a:t>11</a:t>
+            </a:fld>
+            <a:endParaRPr lang="en-US"/>
+          </a:p>
+        </p:txBody>
+      </p:sp>
+    </p:spTree>
+    <p:extLst>
+      <p:ext uri="{BB962C8B-B14F-4D97-AF65-F5344CB8AC3E}">
+        <p14:creationId xmlns:p14="http://schemas.microsoft.com/office/powerpoint/2010/main" val="2857468987"/>
+      </p:ext>
+    </p:extLst>
+  </p:cSld>
+  <p:clrMapOvr>
+    <a:masterClrMapping/>
+  </p:clrMapOvr>
+</p:notes>
+</file>
+
+<file path=ppt/notesSlides/notesSlide4.xml><?xml version="1.0" encoding="utf-8"?>
+<p:notes xmlns:a="http://schemas.openxmlformats.org/drawingml/2006/main" xmlns:r="http://schemas.openxmlformats.org/officeDocument/2006/relationships" xmlns:p="http://schemas.openxmlformats.org/presentationml/2006/main">
+  <p:cSld>
+    <p:spTree>
+      <p:nvGrpSpPr>
+        <p:cNvPr id="1" name=""/>
+        <p:cNvGrpSpPr/>
+        <p:nvPr/>
+      </p:nvGrpSpPr>
+      <p:grpSpPr>
+        <a:xfrm>
+          <a:off x="0" y="0"/>
+          <a:ext cx="0" cy="0"/>
+          <a:chOff x="0" y="0"/>
+          <a:chExt cx="0" cy="0"/>
+        </a:xfrm>
+      </p:grpSpPr>
+      <p:sp>
+        <p:nvSpPr>
+          <p:cNvPr id="2" name="Slide Image Placeholder 1"/>
+          <p:cNvSpPr>
+            <a:spLocks noGrp="1" noRot="1" noChangeAspect="1"/>
+          </p:cNvSpPr>
+          <p:nvPr>
+            <p:ph type="sldImg"/>
+          </p:nvPr>
+        </p:nvSpPr>
+        <p:spPr/>
+      </p:sp>
+      <p:sp>
+        <p:nvSpPr>
+          <p:cNvPr id="3" name="Notes Placeholder 2"/>
+          <p:cNvSpPr>
+            <a:spLocks noGrp="1"/>
+          </p:cNvSpPr>
+          <p:nvPr>
+            <p:ph type="body" idx="1"/>
+          </p:nvPr>
+        </p:nvSpPr>
+        <p:spPr/>
+        <p:txBody>
+          <a:bodyPr/>
+          <a:lstStyle/>
+          <a:p>
+            <a:endParaRPr lang="en-US" dirty="0"/>
+          </a:p>
+        </p:txBody>
+      </p:sp>
+      <p:sp>
+        <p:nvSpPr>
+          <p:cNvPr id="4" name="Slide Number Placeholder 3"/>
+          <p:cNvSpPr>
+            <a:spLocks noGrp="1"/>
+          </p:cNvSpPr>
+          <p:nvPr>
+            <p:ph type="sldNum" sz="quarter" idx="5"/>
+          </p:nvPr>
+        </p:nvSpPr>
+        <p:spPr/>
+        <p:txBody>
+          <a:bodyPr/>
+          <a:lstStyle/>
+          <a:p>
+            <a:fld id="{7FE50167-558C-4D4E-A218-0F44CB45BE81}" type="slidenum">
+              <a:rPr lang="en-US" smtClean="0"/>
+              <a:t>12</a:t>
+            </a:fld>
+            <a:endParaRPr lang="en-US"/>
+          </a:p>
+        </p:txBody>
+      </p:sp>
+    </p:spTree>
+    <p:extLst>
+      <p:ext uri="{BB962C8B-B14F-4D97-AF65-F5344CB8AC3E}">
+        <p14:creationId xmlns:p14="http://schemas.microsoft.com/office/powerpoint/2010/main" val="3375901916"/>
+      </p:ext>
+    </p:extLst>
+  </p:cSld>
+  <p:clrMapOvr>
+    <a:masterClrMapping/>
+  </p:clrMapOvr>
+</p:notes>
+</file>
+
+<file path=ppt/notesSlides/notesSlide5.xml><?xml version="1.0" encoding="utf-8"?>
+<p:notes xmlns:a="http://schemas.openxmlformats.org/drawingml/2006/main" xmlns:r="http://schemas.openxmlformats.org/officeDocument/2006/relationships" xmlns:p="http://schemas.openxmlformats.org/presentationml/2006/main">
+  <p:cSld>
+    <p:spTree>
+      <p:nvGrpSpPr>
+        <p:cNvPr id="1" name=""/>
+        <p:cNvGrpSpPr/>
+        <p:nvPr/>
+      </p:nvGrpSpPr>
+      <p:grpSpPr>
+        <a:xfrm>
+          <a:off x="0" y="0"/>
+          <a:ext cx="0" cy="0"/>
+          <a:chOff x="0" y="0"/>
+          <a:chExt cx="0" cy="0"/>
+        </a:xfrm>
+      </p:grpSpPr>
+      <p:sp>
+        <p:nvSpPr>
+          <p:cNvPr id="2" name="Slide Image Placeholder 1"/>
+          <p:cNvSpPr>
+            <a:spLocks noGrp="1" noRot="1" noChangeAspect="1"/>
+          </p:cNvSpPr>
+          <p:nvPr>
+            <p:ph type="sldImg"/>
+          </p:nvPr>
+        </p:nvSpPr>
+        <p:spPr/>
+      </p:sp>
+      <p:sp>
+        <p:nvSpPr>
+          <p:cNvPr id="3" name="Notes Placeholder 2"/>
+          <p:cNvSpPr>
+            <a:spLocks noGrp="1"/>
+          </p:cNvSpPr>
+          <p:nvPr>
+            <p:ph type="body" idx="1"/>
+          </p:nvPr>
+        </p:nvSpPr>
+        <p:spPr/>
+        <p:txBody>
+          <a:bodyPr/>
+          <a:lstStyle/>
+          <a:p>
+            <a:endParaRPr lang="en-US" dirty="0"/>
+          </a:p>
+        </p:txBody>
+      </p:sp>
+      <p:sp>
+        <p:nvSpPr>
+          <p:cNvPr id="4" name="Slide Number Placeholder 3"/>
+          <p:cNvSpPr>
+            <a:spLocks noGrp="1"/>
+          </p:cNvSpPr>
+          <p:nvPr>
+            <p:ph type="sldNum" sz="quarter" idx="5"/>
+          </p:nvPr>
+        </p:nvSpPr>
+        <p:spPr/>
+        <p:txBody>
+          <a:bodyPr/>
+          <a:lstStyle/>
+          <a:p>
+            <a:fld id="{7FE50167-558C-4D4E-A218-0F44CB45BE81}" type="slidenum">
+              <a:rPr lang="en-US" smtClean="0"/>
+              <a:t>14</a:t>
+            </a:fld>
+            <a:endParaRPr lang="en-US"/>
+          </a:p>
+        </p:txBody>
+      </p:sp>
+    </p:spTree>
+    <p:extLst>
+      <p:ext uri="{BB962C8B-B14F-4D97-AF65-F5344CB8AC3E}">
+        <p14:creationId xmlns:p14="http://schemas.microsoft.com/office/powerpoint/2010/main" val="1723431945"/>
+      </p:ext>
+    </p:extLst>
+  </p:cSld>
+  <p:clrMapOvr>
+    <a:masterClrMapping/>
+  </p:clrMapOvr>
+</p:notes>
+</file>
+
+<file path=ppt/notesSlides/notesSlide6.xml><?xml version="1.0" encoding="utf-8"?>
+<p:notes xmlns:a="http://schemas.openxmlformats.org/drawingml/2006/main" xmlns:r="http://schemas.openxmlformats.org/officeDocument/2006/relationships" xmlns:p="http://schemas.openxmlformats.org/presentationml/2006/main">
+  <p:cSld>
+    <p:spTree>
+      <p:nvGrpSpPr>
+        <p:cNvPr id="1" name=""/>
+        <p:cNvGrpSpPr/>
+        <p:nvPr/>
+      </p:nvGrpSpPr>
+      <p:grpSpPr>
+        <a:xfrm>
+          <a:off x="0" y="0"/>
+          <a:ext cx="0" cy="0"/>
+          <a:chOff x="0" y="0"/>
+          <a:chExt cx="0" cy="0"/>
+        </a:xfrm>
+      </p:grpSpPr>
+      <p:sp>
+        <p:nvSpPr>
+          <p:cNvPr id="2" name="Slide Image Placeholder 1"/>
+          <p:cNvSpPr>
+            <a:spLocks noGrp="1" noRot="1" noChangeAspect="1"/>
+          </p:cNvSpPr>
+          <p:nvPr>
+            <p:ph type="sldImg"/>
+          </p:nvPr>
+        </p:nvSpPr>
+        <p:spPr/>
+      </p:sp>
+      <p:sp>
+        <p:nvSpPr>
+          <p:cNvPr id="3" name="Notes Placeholder 2"/>
+          <p:cNvSpPr>
+            <a:spLocks noGrp="1"/>
+          </p:cNvSpPr>
+          <p:nvPr>
+            <p:ph type="body" idx="1"/>
+          </p:nvPr>
+        </p:nvSpPr>
+        <p:spPr/>
+        <p:txBody>
+          <a:bodyPr/>
+          <a:lstStyle/>
+          <a:p>
+            <a:r>
+              <a:rPr lang="en-US" dirty="0"/>
+              <a:t>T101389-s1-customtagnewdataset</a:t>
+            </a:r>
+          </a:p>
+        </p:txBody>
+      </p:sp>
+      <p:sp>
+        <p:nvSpPr>
+          <p:cNvPr id="4" name="Slide Number Placeholder 3"/>
+          <p:cNvSpPr>
+            <a:spLocks noGrp="1"/>
+          </p:cNvSpPr>
+          <p:nvPr>
+            <p:ph type="sldNum" sz="quarter" idx="5"/>
+          </p:nvPr>
+        </p:nvSpPr>
+        <p:spPr/>
+        <p:txBody>
+          <a:bodyPr/>
+          <a:lstStyle/>
+          <a:p>
+            <a:fld id="{7FE50167-558C-4D4E-A218-0F44CB45BE81}" type="slidenum">
+              <a:rPr lang="en-US" smtClean="0"/>
+              <a:t>15</a:t>
+            </a:fld>
+            <a:endParaRPr lang="en-US"/>
+          </a:p>
+        </p:txBody>
+      </p:sp>
+    </p:spTree>
+    <p:extLst>
+      <p:ext uri="{BB962C8B-B14F-4D97-AF65-F5344CB8AC3E}">
+        <p14:creationId xmlns:p14="http://schemas.microsoft.com/office/powerpoint/2010/main" val="3574965043"/>
       </p:ext>
     </p:extLst>
   </p:cSld>
@@ -1106,7 +1665,7 @@
           <a:p>
             <a:r>
               <a:rPr lang="en-US" dirty="0"/>
-              <a:t>E1016404-20-autotag-policy-run-completed</a:t>
+              <a:t>T101389-s1-exporttomanifest</a:t>
             </a:r>
           </a:p>
         </p:txBody>
@@ -1126,78 +1685,18 @@
           <a:bodyPr/>
           <a:lstStyle/>
           <a:p>
-            <a:pPr marL="0" marR="0" lvl="0" indent="0" algn="r" defTabSz="914400" rtl="0" eaLnBrk="1" fontAlgn="auto" latinLnBrk="0" hangingPunct="1">
-              <a:lnSpc>
-                <a:spcPct val="100000"/>
-              </a:lnSpc>
-              <a:spcBef>
-                <a:spcPts val="0"/>
-              </a:spcBef>
-              <a:spcAft>
-                <a:spcPts val="0"/>
-              </a:spcAft>
-              <a:buClrTx/>
-              <a:buSzTx/>
-              <a:buFontTx/>
-              <a:buNone/>
-              <a:tabLst/>
-              <a:defRPr/>
-            </a:pPr>
-            <a:fld id="{C37639F4-367D-4C6D-AF3D-3EF385521B21}" type="slidenum">
-              <a:rPr kumimoji="0" lang="en-US" sz="1200" b="0" i="0" u="none" strike="noStrike" kern="1200" cap="none" spc="0" normalizeH="0" baseline="0" noProof="0" smtClean="0">
-                <a:ln>
-                  <a:noFill/>
-                </a:ln>
-                <a:solidFill>
-                  <a:prstClr val="black"/>
-                </a:solidFill>
-                <a:effectLst/>
-                <a:uLnTx/>
-                <a:uFillTx/>
-                <a:latin typeface="Calibri" panose="020F0502020204030204"/>
-                <a:ea typeface="+mn-ea"/>
-                <a:cs typeface="+mn-cs"/>
-              </a:rPr>
-              <a:pPr marL="0" marR="0" lvl="0" indent="0" algn="r" defTabSz="914400" rtl="0" eaLnBrk="1" fontAlgn="auto" latinLnBrk="0" hangingPunct="1">
-                <a:lnSpc>
-                  <a:spcPct val="100000"/>
-                </a:lnSpc>
-                <a:spcBef>
-                  <a:spcPts val="0"/>
-                </a:spcBef>
-                <a:spcAft>
-                  <a:spcPts val="0"/>
-                </a:spcAft>
-                <a:buClrTx/>
-                <a:buSzTx/>
-                <a:buFontTx/>
-                <a:buNone/>
-                <a:tabLst/>
-                <a:defRPr/>
-              </a:pPr>
-              <a:t>25</a:t>
+            <a:fld id="{7FE50167-558C-4D4E-A218-0F44CB45BE81}" type="slidenum">
+              <a:rPr lang="en-US" smtClean="0"/>
+              <a:t>16</a:t>
             </a:fld>
-            <a:endParaRPr kumimoji="0" lang="en-US" sz="1200" b="0" i="0" u="none" strike="noStrike" kern="1200" cap="none" spc="0" normalizeH="0" baseline="0" noProof="0">
-              <a:ln>
-                <a:noFill/>
-              </a:ln>
-              <a:solidFill>
-                <a:prstClr val="black"/>
-              </a:solidFill>
-              <a:effectLst/>
-              <a:uLnTx/>
-              <a:uFillTx/>
-              <a:latin typeface="Calibri" panose="020F0502020204030204"/>
-              <a:ea typeface="+mn-ea"/>
-              <a:cs typeface="+mn-cs"/>
-            </a:endParaRPr>
+            <a:endParaRPr lang="en-US"/>
           </a:p>
         </p:txBody>
       </p:sp>
     </p:spTree>
     <p:extLst>
       <p:ext uri="{BB962C8B-B14F-4D97-AF65-F5344CB8AC3E}">
-        <p14:creationId xmlns:p14="http://schemas.microsoft.com/office/powerpoint/2010/main" val="3273163760"/>
+        <p14:creationId xmlns:p14="http://schemas.microsoft.com/office/powerpoint/2010/main" val="520174725"/>
       </p:ext>
     </p:extLst>
   </p:cSld>
@@ -1251,26 +1750,9 @@
           <a:bodyPr/>
           <a:lstStyle/>
           <a:p>
-            <a:pPr marL="0" marR="0" lvl="0" indent="0" algn="l" defTabSz="914400" rtl="0" eaLnBrk="1" fontAlgn="auto" latinLnBrk="0" hangingPunct="1">
-              <a:lnSpc>
-                <a:spcPct val="100000"/>
-              </a:lnSpc>
-              <a:spcBef>
-                <a:spcPts val="0"/>
-              </a:spcBef>
-              <a:spcAft>
-                <a:spcPts val="0"/>
-              </a:spcAft>
-              <a:buClrTx/>
-              <a:buSzTx/>
-              <a:buFontTx/>
-              <a:buNone/>
-              <a:tabLst/>
-              <a:defRPr/>
-            </a:pPr>
             <a:r>
               <a:rPr lang="en-US" dirty="0"/>
-              <a:t>E1016404-30-query-for-new-dataset</a:t>
+              <a:t>T101389-s1-exporttomanifest2</a:t>
             </a:r>
           </a:p>
         </p:txBody>
@@ -1290,78 +1772,18 @@
           <a:bodyPr/>
           <a:lstStyle/>
           <a:p>
-            <a:pPr marL="0" marR="0" lvl="0" indent="0" algn="r" defTabSz="914400" rtl="0" eaLnBrk="1" fontAlgn="auto" latinLnBrk="0" hangingPunct="1">
-              <a:lnSpc>
-                <a:spcPct val="100000"/>
-              </a:lnSpc>
-              <a:spcBef>
-                <a:spcPts val="0"/>
-              </a:spcBef>
-              <a:spcAft>
-                <a:spcPts val="0"/>
-              </a:spcAft>
-              <a:buClrTx/>
-              <a:buSzTx/>
-              <a:buFontTx/>
-              <a:buNone/>
-              <a:tabLst/>
-              <a:defRPr/>
-            </a:pPr>
-            <a:fld id="{C37639F4-367D-4C6D-AF3D-3EF385521B21}" type="slidenum">
-              <a:rPr kumimoji="0" lang="en-US" sz="1200" b="0" i="0" u="none" strike="noStrike" kern="1200" cap="none" spc="0" normalizeH="0" baseline="0" noProof="0" smtClean="0">
-                <a:ln>
-                  <a:noFill/>
-                </a:ln>
-                <a:solidFill>
-                  <a:prstClr val="black"/>
-                </a:solidFill>
-                <a:effectLst/>
-                <a:uLnTx/>
-                <a:uFillTx/>
-                <a:latin typeface="Calibri" panose="020F0502020204030204"/>
-                <a:ea typeface="+mn-ea"/>
-                <a:cs typeface="+mn-cs"/>
-              </a:rPr>
-              <a:pPr marL="0" marR="0" lvl="0" indent="0" algn="r" defTabSz="914400" rtl="0" eaLnBrk="1" fontAlgn="auto" latinLnBrk="0" hangingPunct="1">
-                <a:lnSpc>
-                  <a:spcPct val="100000"/>
-                </a:lnSpc>
-                <a:spcBef>
-                  <a:spcPts val="0"/>
-                </a:spcBef>
-                <a:spcAft>
-                  <a:spcPts val="0"/>
-                </a:spcAft>
-                <a:buClrTx/>
-                <a:buSzTx/>
-                <a:buFontTx/>
-                <a:buNone/>
-                <a:tabLst/>
-                <a:defRPr/>
-              </a:pPr>
-              <a:t>26</a:t>
+            <a:fld id="{7FE50167-558C-4D4E-A218-0F44CB45BE81}" type="slidenum">
+              <a:rPr lang="en-US" smtClean="0"/>
+              <a:t>17</a:t>
             </a:fld>
-            <a:endParaRPr kumimoji="0" lang="en-US" sz="1200" b="0" i="0" u="none" strike="noStrike" kern="1200" cap="none" spc="0" normalizeH="0" baseline="0" noProof="0">
-              <a:ln>
-                <a:noFill/>
-              </a:ln>
-              <a:solidFill>
-                <a:prstClr val="black"/>
-              </a:solidFill>
-              <a:effectLst/>
-              <a:uLnTx/>
-              <a:uFillTx/>
-              <a:latin typeface="Calibri" panose="020F0502020204030204"/>
-              <a:ea typeface="+mn-ea"/>
-              <a:cs typeface="+mn-cs"/>
-            </a:endParaRPr>
+            <a:endParaRPr lang="en-US"/>
           </a:p>
         </p:txBody>
       </p:sp>
     </p:spTree>
     <p:extLst>
       <p:ext uri="{BB962C8B-B14F-4D97-AF65-F5344CB8AC3E}">
-        <p14:creationId xmlns:p14="http://schemas.microsoft.com/office/powerpoint/2010/main" val="2482503278"/>
+        <p14:creationId xmlns:p14="http://schemas.microsoft.com/office/powerpoint/2010/main" val="4083586629"/>
       </p:ext>
     </p:extLst>
   </p:cSld>
@@ -1434,7 +1856,7 @@
             </a:pPr>
             <a:r>
               <a:rPr lang="en-US" dirty="0"/>
-              <a:t>E1016404-40-new-dataset-w-calculated-tag</a:t>
+              <a:t>T101389-s1-04-manifest-report-stored-in-discover</a:t>
             </a:r>
           </a:p>
         </p:txBody>
@@ -1454,78 +1876,18 @@
           <a:bodyPr/>
           <a:lstStyle/>
           <a:p>
-            <a:pPr marL="0" marR="0" lvl="0" indent="0" algn="r" defTabSz="914400" rtl="0" eaLnBrk="1" fontAlgn="auto" latinLnBrk="0" hangingPunct="1">
-              <a:lnSpc>
-                <a:spcPct val="100000"/>
-              </a:lnSpc>
-              <a:spcBef>
-                <a:spcPts val="0"/>
-              </a:spcBef>
-              <a:spcAft>
-                <a:spcPts val="0"/>
-              </a:spcAft>
-              <a:buClrTx/>
-              <a:buSzTx/>
-              <a:buFontTx/>
-              <a:buNone/>
-              <a:tabLst/>
-              <a:defRPr/>
-            </a:pPr>
-            <a:fld id="{C37639F4-367D-4C6D-AF3D-3EF385521B21}" type="slidenum">
-              <a:rPr kumimoji="0" lang="en-US" sz="1200" b="0" i="0" u="none" strike="noStrike" kern="1200" cap="none" spc="0" normalizeH="0" baseline="0" noProof="0" smtClean="0">
-                <a:ln>
-                  <a:noFill/>
-                </a:ln>
-                <a:solidFill>
-                  <a:prstClr val="black"/>
-                </a:solidFill>
-                <a:effectLst/>
-                <a:uLnTx/>
-                <a:uFillTx/>
-                <a:latin typeface="Calibri" panose="020F0502020204030204"/>
-                <a:ea typeface="+mn-ea"/>
-                <a:cs typeface="+mn-cs"/>
-              </a:rPr>
-              <a:pPr marL="0" marR="0" lvl="0" indent="0" algn="r" defTabSz="914400" rtl="0" eaLnBrk="1" fontAlgn="auto" latinLnBrk="0" hangingPunct="1">
-                <a:lnSpc>
-                  <a:spcPct val="100000"/>
-                </a:lnSpc>
-                <a:spcBef>
-                  <a:spcPts val="0"/>
-                </a:spcBef>
-                <a:spcAft>
-                  <a:spcPts val="0"/>
-                </a:spcAft>
-                <a:buClrTx/>
-                <a:buSzTx/>
-                <a:buFontTx/>
-                <a:buNone/>
-                <a:tabLst/>
-                <a:defRPr/>
-              </a:pPr>
-              <a:t>27</a:t>
+            <a:fld id="{7FE50167-558C-4D4E-A218-0F44CB45BE81}" type="slidenum">
+              <a:rPr lang="en-US" smtClean="0"/>
+              <a:t>18</a:t>
             </a:fld>
-            <a:endParaRPr kumimoji="0" lang="en-US" sz="1200" b="0" i="0" u="none" strike="noStrike" kern="1200" cap="none" spc="0" normalizeH="0" baseline="0" noProof="0">
-              <a:ln>
-                <a:noFill/>
-              </a:ln>
-              <a:solidFill>
-                <a:prstClr val="black"/>
-              </a:solidFill>
-              <a:effectLst/>
-              <a:uLnTx/>
-              <a:uFillTx/>
-              <a:latin typeface="Calibri" panose="020F0502020204030204"/>
-              <a:ea typeface="+mn-ea"/>
-              <a:cs typeface="+mn-cs"/>
-            </a:endParaRPr>
+            <a:endParaRPr lang="en-US"/>
           </a:p>
         </p:txBody>
       </p:sp>
     </p:spTree>
     <p:extLst>
       <p:ext uri="{BB962C8B-B14F-4D97-AF65-F5344CB8AC3E}">
-        <p14:creationId xmlns:p14="http://schemas.microsoft.com/office/powerpoint/2010/main" val="4023775969"/>
+        <p14:creationId xmlns:p14="http://schemas.microsoft.com/office/powerpoint/2010/main" val="2515915617"/>
       </p:ext>
     </p:extLst>
   </p:cSld>
@@ -5451,78 +5813,6 @@
       </p:grpSpPr>
       <p:sp>
         <p:nvSpPr>
-          <p:cNvPr id="2" name="Title 1">
-            <a:extLst>
-              <a:ext uri="{FF2B5EF4-FFF2-40B4-BE49-F238E27FC236}">
-                <a16:creationId xmlns:a16="http://schemas.microsoft.com/office/drawing/2014/main" id="{E44F8F50-F463-4161-8FE4-2C8AD24AF0A4}"/>
-              </a:ext>
-            </a:extLst>
-          </p:cNvPr>
-          <p:cNvSpPr>
-            <a:spLocks noGrp="1"/>
-          </p:cNvSpPr>
-          <p:nvPr>
-            <p:ph type="title"/>
-          </p:nvPr>
-        </p:nvSpPr>
-        <p:spPr>
-          <a:xfrm>
-            <a:off x="720213" y="3039845"/>
-            <a:ext cx="10515600" cy="778310"/>
-          </a:xfrm>
-        </p:spPr>
-        <p:txBody>
-          <a:bodyPr>
-            <a:normAutofit/>
-          </a:bodyPr>
-          <a:lstStyle/>
-          <a:p>
-            <a:pPr algn="l"/>
-            <a:r>
-              <a:rPr lang="en-US" sz="2800" b="1" i="0" dirty="0">
-                <a:solidFill>
-                  <a:srgbClr val="24292F"/>
-                </a:solidFill>
-                <a:effectLst/>
-                <a:latin typeface="-apple-system"/>
-              </a:rPr>
-              <a:t>4. Custom-tag the New Dataset</a:t>
-            </a:r>
-          </a:p>
-        </p:txBody>
-      </p:sp>
-    </p:spTree>
-    <p:extLst>
-      <p:ext uri="{BB962C8B-B14F-4D97-AF65-F5344CB8AC3E}">
-        <p14:creationId xmlns:p14="http://schemas.microsoft.com/office/powerpoint/2010/main" val="3358068762"/>
-      </p:ext>
-    </p:extLst>
-  </p:cSld>
-  <p:clrMapOvr>
-    <a:masterClrMapping/>
-  </p:clrMapOvr>
-</p:sld>
-</file>
-
-<file path=ppt/slides/slide13.xml><?xml version="1.0" encoding="utf-8"?>
-<p:sld xmlns:a="http://schemas.openxmlformats.org/drawingml/2006/main" xmlns:r="http://schemas.openxmlformats.org/officeDocument/2006/relationships" xmlns:p="http://schemas.openxmlformats.org/presentationml/2006/main">
-  <p:cSld>
-    <p:spTree>
-      <p:nvGrpSpPr>
-        <p:cNvPr id="1" name=""/>
-        <p:cNvGrpSpPr/>
-        <p:nvPr/>
-      </p:nvGrpSpPr>
-      <p:grpSpPr>
-        <a:xfrm>
-          <a:off x="0" y="0"/>
-          <a:ext cx="0" cy="0"/>
-          <a:chOff x="0" y="0"/>
-          <a:chExt cx="0" cy="0"/>
-        </a:xfrm>
-      </p:grpSpPr>
-      <p:sp>
-        <p:nvSpPr>
           <p:cNvPr id="6" name="TextBox 5">
             <a:extLst>
               <a:ext uri="{FF2B5EF4-FFF2-40B4-BE49-F238E27FC236}">
@@ -5681,6 +5971,78 @@
 </p:sld>
 </file>
 
+<file path=ppt/slides/slide13.xml><?xml version="1.0" encoding="utf-8"?>
+<p:sld xmlns:a="http://schemas.openxmlformats.org/drawingml/2006/main" xmlns:r="http://schemas.openxmlformats.org/officeDocument/2006/relationships" xmlns:p="http://schemas.openxmlformats.org/presentationml/2006/main">
+  <p:cSld>
+    <p:spTree>
+      <p:nvGrpSpPr>
+        <p:cNvPr id="1" name=""/>
+        <p:cNvGrpSpPr/>
+        <p:nvPr/>
+      </p:nvGrpSpPr>
+      <p:grpSpPr>
+        <a:xfrm>
+          <a:off x="0" y="0"/>
+          <a:ext cx="0" cy="0"/>
+          <a:chOff x="0" y="0"/>
+          <a:chExt cx="0" cy="0"/>
+        </a:xfrm>
+      </p:grpSpPr>
+      <p:sp>
+        <p:nvSpPr>
+          <p:cNvPr id="2" name="Title 1">
+            <a:extLst>
+              <a:ext uri="{FF2B5EF4-FFF2-40B4-BE49-F238E27FC236}">
+                <a16:creationId xmlns:a16="http://schemas.microsoft.com/office/drawing/2014/main" id="{E44F8F50-F463-4161-8FE4-2C8AD24AF0A4}"/>
+              </a:ext>
+            </a:extLst>
+          </p:cNvPr>
+          <p:cNvSpPr>
+            <a:spLocks noGrp="1"/>
+          </p:cNvSpPr>
+          <p:nvPr>
+            <p:ph type="title"/>
+          </p:nvPr>
+        </p:nvSpPr>
+        <p:spPr>
+          <a:xfrm>
+            <a:off x="720213" y="3039845"/>
+            <a:ext cx="10515600" cy="778310"/>
+          </a:xfrm>
+        </p:spPr>
+        <p:txBody>
+          <a:bodyPr>
+            <a:normAutofit/>
+          </a:bodyPr>
+          <a:lstStyle/>
+          <a:p>
+            <a:pPr algn="l"/>
+            <a:r>
+              <a:rPr lang="en-US" sz="2800" b="1" i="0" dirty="0">
+                <a:solidFill>
+                  <a:srgbClr val="24292F"/>
+                </a:solidFill>
+                <a:effectLst/>
+                <a:latin typeface="-apple-system"/>
+              </a:rPr>
+              <a:t>4. Custom-tag the New Dataset</a:t>
+            </a:r>
+          </a:p>
+        </p:txBody>
+      </p:sp>
+    </p:spTree>
+    <p:extLst>
+      <p:ext uri="{BB962C8B-B14F-4D97-AF65-F5344CB8AC3E}">
+        <p14:creationId xmlns:p14="http://schemas.microsoft.com/office/powerpoint/2010/main" val="3358068762"/>
+      </p:ext>
+    </p:extLst>
+  </p:cSld>
+  <p:clrMapOvr>
+    <a:masterClrMapping/>
+  </p:clrMapOvr>
+</p:sld>
+</file>
+
 <file path=ppt/slides/slide14.xml><?xml version="1.0" encoding="utf-8"?>
 <p:sld xmlns:a="http://schemas.openxmlformats.org/drawingml/2006/main" xmlns:r="http://schemas.openxmlformats.org/officeDocument/2006/relationships" xmlns:p="http://schemas.openxmlformats.org/presentationml/2006/main">
   <p:cSld>
@@ -5698,54 +6060,6 @@
           <a:chExt cx="0" cy="0"/>
         </a:xfrm>
       </p:grpSpPr>
-      <p:sp>
-        <p:nvSpPr>
-          <p:cNvPr id="6" name="TextBox 5">
-            <a:extLst>
-              <a:ext uri="{FF2B5EF4-FFF2-40B4-BE49-F238E27FC236}">
-                <a16:creationId xmlns:a16="http://schemas.microsoft.com/office/drawing/2014/main" id="{EBB52298-5DC8-495B-A05C-C8E6A6AE32DD}"/>
-              </a:ext>
-            </a:extLst>
-          </p:cNvPr>
-          <p:cNvSpPr txBox="1"/>
-          <p:nvPr/>
-        </p:nvSpPr>
-        <p:spPr>
-          <a:xfrm>
-            <a:off x="0" y="0"/>
-            <a:ext cx="12192000" cy="307777"/>
-          </a:xfrm>
-          <a:prstGeom prst="rect">
-            <a:avLst/>
-          </a:prstGeom>
-          <a:solidFill>
-            <a:schemeClr val="tx1"/>
-          </a:solidFill>
-        </p:spPr>
-        <p:txBody>
-          <a:bodyPr wrap="square">
-            <a:spAutoFit/>
-          </a:bodyPr>
-          <a:lstStyle/>
-          <a:p>
-            <a:r>
-              <a:rPr lang="en-US" sz="1400" b="1" i="0" dirty="0">
-                <a:solidFill>
-                  <a:schemeClr val="bg1"/>
-                </a:solidFill>
-                <a:effectLst/>
-                <a:latin typeface="-apple-system"/>
-              </a:rPr>
-              <a:t>Custom-Tag Dataset</a:t>
-            </a:r>
-            <a:endParaRPr lang="en-US" sz="1400" dirty="0">
-              <a:solidFill>
-                <a:schemeClr val="bg1"/>
-              </a:solidFill>
-            </a:endParaRPr>
-          </a:p>
-        </p:txBody>
-      </p:sp>
       <p:pic>
         <p:nvPicPr>
           <p:cNvPr id="4" name="Picture 3">
@@ -5912,10 +6226,10 @@
       </p:grpSpPr>
       <p:pic>
         <p:nvPicPr>
-          <p:cNvPr id="8" name="Picture 7">
-            <a:extLst>
-              <a:ext uri="{FF2B5EF4-FFF2-40B4-BE49-F238E27FC236}">
-                <a16:creationId xmlns:a16="http://schemas.microsoft.com/office/drawing/2014/main" id="{EB9EBD7A-8DF6-43F9-9EE5-388BB05377B7}"/>
+          <p:cNvPr id="6" name="Picture 5">
+            <a:extLst>
+              <a:ext uri="{FF2B5EF4-FFF2-40B4-BE49-F238E27FC236}">
+                <a16:creationId xmlns:a16="http://schemas.microsoft.com/office/drawing/2014/main" id="{C15C512D-381F-49AC-8533-4B3AE4FE089B}"/>
               </a:ext>
             </a:extLst>
           </p:cNvPr>
@@ -5925,15 +6239,15 @@
           <p:nvPr/>
         </p:nvPicPr>
         <p:blipFill>
-          <a:blip r:embed="rId2"/>
+          <a:blip r:embed="rId3"/>
           <a:stretch>
             <a:fillRect/>
           </a:stretch>
         </p:blipFill>
         <p:spPr>
           <a:xfrm>
-            <a:off x="0" y="730361"/>
-            <a:ext cx="12192000" cy="5397277"/>
+            <a:off x="0" y="160819"/>
+            <a:ext cx="12192000" cy="6536362"/>
           </a:xfrm>
           <a:prstGeom prst="rect">
             <a:avLst/>
@@ -5942,10 +6256,10 @@
       </p:pic>
       <p:sp>
         <p:nvSpPr>
-          <p:cNvPr id="7" name="Arrow: Right 6">
-            <a:extLst>
-              <a:ext uri="{FF2B5EF4-FFF2-40B4-BE49-F238E27FC236}">
-                <a16:creationId xmlns:a16="http://schemas.microsoft.com/office/drawing/2014/main" id="{0F7A06A6-F10B-4F98-BD01-89872AFB3F74}"/>
+          <p:cNvPr id="9" name="Arrow: Right 8">
+            <a:extLst>
+              <a:ext uri="{FF2B5EF4-FFF2-40B4-BE49-F238E27FC236}">
+                <a16:creationId xmlns:a16="http://schemas.microsoft.com/office/drawing/2014/main" id="{796EF17F-3774-430C-8550-A30A0E6CE147}"/>
               </a:ext>
             </a:extLst>
           </p:cNvPr>
@@ -5953,8 +6267,8 @@
           <p:nvPr/>
         </p:nvSpPr>
         <p:spPr>
-          <a:xfrm rot="10800000">
-            <a:off x="7003125" y="2193348"/>
+          <a:xfrm rot="5400000">
+            <a:off x="11021216" y="745069"/>
             <a:ext cx="374073" cy="290946"/>
           </a:xfrm>
           <a:prstGeom prst="rightArrow">
@@ -5994,56 +6308,60 @@
       </p:sp>
       <p:sp>
         <p:nvSpPr>
-          <p:cNvPr id="9" name="TextBox 8">
-            <a:extLst>
-              <a:ext uri="{FF2B5EF4-FFF2-40B4-BE49-F238E27FC236}">
-                <a16:creationId xmlns:a16="http://schemas.microsoft.com/office/drawing/2014/main" id="{4D806B75-5BA0-4E83-91FD-AED855EEC0FB}"/>
-              </a:ext>
-            </a:extLst>
-          </p:cNvPr>
-          <p:cNvSpPr txBox="1"/>
+          <p:cNvPr id="11" name="Rectangle 10">
+            <a:extLst>
+              <a:ext uri="{FF2B5EF4-FFF2-40B4-BE49-F238E27FC236}">
+                <a16:creationId xmlns:a16="http://schemas.microsoft.com/office/drawing/2014/main" id="{9C6AD9D5-8A56-4838-A1D3-FA6D3EE6C7CC}"/>
+              </a:ext>
+            </a:extLst>
+          </p:cNvPr>
+          <p:cNvSpPr/>
           <p:nvPr/>
         </p:nvSpPr>
         <p:spPr>
           <a:xfrm>
-            <a:off x="0" y="0"/>
-            <a:ext cx="12192000" cy="307777"/>
+            <a:off x="10820249" y="1077578"/>
+            <a:ext cx="929299" cy="4457983"/>
           </a:xfrm>
           <a:prstGeom prst="rect">
             <a:avLst/>
           </a:prstGeom>
-          <a:solidFill>
-            <a:schemeClr val="tx1"/>
-          </a:solidFill>
+          <a:noFill/>
+          <a:ln w="38100">
+            <a:solidFill>
+              <a:srgbClr val="FF0000"/>
+            </a:solidFill>
+          </a:ln>
         </p:spPr>
-        <p:txBody>
-          <a:bodyPr wrap="square">
-            <a:spAutoFit/>
-          </a:bodyPr>
-          <a:lstStyle/>
-          <a:p>
-            <a:r>
-              <a:rPr lang="en-US" sz="1400" b="1" i="0" dirty="0">
-                <a:solidFill>
-                  <a:schemeClr val="bg1"/>
-                </a:solidFill>
-                <a:effectLst/>
-                <a:latin typeface="-apple-system"/>
-              </a:rPr>
-              <a:t>Custom-Tag Dataset</a:t>
-            </a:r>
-            <a:endParaRPr lang="en-US" sz="1400" dirty="0">
-              <a:solidFill>
-                <a:schemeClr val="bg1"/>
-              </a:solidFill>
-            </a:endParaRPr>
+        <p:style>
+          <a:lnRef idx="2">
+            <a:schemeClr val="accent1">
+              <a:shade val="50000"/>
+            </a:schemeClr>
+          </a:lnRef>
+          <a:fillRef idx="1">
+            <a:schemeClr val="accent1"/>
+          </a:fillRef>
+          <a:effectRef idx="0">
+            <a:schemeClr val="accent1"/>
+          </a:effectRef>
+          <a:fontRef idx="minor">
+            <a:schemeClr val="lt1"/>
+          </a:fontRef>
+        </p:style>
+        <p:txBody>
+          <a:bodyPr rtlCol="0" anchor="ctr"/>
+          <a:lstStyle/>
+          <a:p>
+            <a:pPr algn="ctr"/>
+            <a:endParaRPr lang="en-US"/>
           </a:p>
         </p:txBody>
       </p:sp>
     </p:spTree>
     <p:extLst>
       <p:ext uri="{BB962C8B-B14F-4D97-AF65-F5344CB8AC3E}">
-        <p14:creationId xmlns:p14="http://schemas.microsoft.com/office/powerpoint/2010/main" val="1755812507"/>
+        <p14:creationId xmlns:p14="http://schemas.microsoft.com/office/powerpoint/2010/main" val="3350390015"/>
       </p:ext>
     </p:extLst>
   </p:cSld>
@@ -6072,10 +6390,10 @@
       </p:grpSpPr>
       <p:pic>
         <p:nvPicPr>
-          <p:cNvPr id="4" name="Picture 3">
-            <a:extLst>
-              <a:ext uri="{FF2B5EF4-FFF2-40B4-BE49-F238E27FC236}">
-                <a16:creationId xmlns:a16="http://schemas.microsoft.com/office/drawing/2014/main" id="{C6B99636-5E8B-4774-92DB-38DB10FEFFF3}"/>
+          <p:cNvPr id="5" name="Picture 4">
+            <a:extLst>
+              <a:ext uri="{FF2B5EF4-FFF2-40B4-BE49-F238E27FC236}">
+                <a16:creationId xmlns:a16="http://schemas.microsoft.com/office/drawing/2014/main" id="{7041E5E1-9457-4AAA-B7B0-8B63212AE348}"/>
               </a:ext>
             </a:extLst>
           </p:cNvPr>
@@ -6085,15 +6403,15 @@
           <p:nvPr/>
         </p:nvPicPr>
         <p:blipFill>
-          <a:blip r:embed="rId2"/>
+          <a:blip r:embed="rId3"/>
           <a:stretch>
             <a:fillRect/>
           </a:stretch>
         </p:blipFill>
         <p:spPr>
           <a:xfrm>
-            <a:off x="0" y="837028"/>
-            <a:ext cx="12192000" cy="5183943"/>
+            <a:off x="0" y="169968"/>
+            <a:ext cx="12192000" cy="6518064"/>
           </a:xfrm>
           <a:prstGeom prst="rect">
             <a:avLst/>
@@ -6102,10 +6420,10 @@
       </p:pic>
       <p:sp>
         <p:nvSpPr>
-          <p:cNvPr id="8" name="Rectangle 7">
-            <a:extLst>
-              <a:ext uri="{FF2B5EF4-FFF2-40B4-BE49-F238E27FC236}">
-                <a16:creationId xmlns:a16="http://schemas.microsoft.com/office/drawing/2014/main" id="{8B9646D7-2083-491E-8ADB-6E4820DC7751}"/>
+          <p:cNvPr id="6" name="Arrow: Right 5">
+            <a:extLst>
+              <a:ext uri="{FF2B5EF4-FFF2-40B4-BE49-F238E27FC236}">
+                <a16:creationId xmlns:a16="http://schemas.microsoft.com/office/drawing/2014/main" id="{6B1F34A1-FB7F-4B6D-8718-4C3C35609CC4}"/>
               </a:ext>
             </a:extLst>
           </p:cNvPr>
@@ -6113,18 +6431,18 @@
           <p:nvPr/>
         </p:nvSpPr>
         <p:spPr>
-          <a:xfrm>
-            <a:off x="9563447" y="1793297"/>
-            <a:ext cx="942627" cy="3750253"/>
+          <a:xfrm rot="5400000">
+            <a:off x="9035100" y="231196"/>
+            <a:ext cx="374073" cy="290946"/>
           </a:xfrm>
-          <a:prstGeom prst="rect">
+          <a:prstGeom prst="rightArrow">
             <a:avLst/>
           </a:prstGeom>
-          <a:noFill/>
-          <a:ln w="38100">
-            <a:solidFill>
-              <a:srgbClr val="FF0000"/>
-            </a:solidFill>
+          <a:solidFill>
+            <a:srgbClr val="FF0000"/>
+          </a:solidFill>
+          <a:ln>
+            <a:noFill/>
           </a:ln>
         </p:spPr>
         <p:style>
@@ -6152,58 +6470,10 @@
           </a:p>
         </p:txBody>
       </p:sp>
-      <p:sp>
-        <p:nvSpPr>
-          <p:cNvPr id="7" name="TextBox 6">
-            <a:extLst>
-              <a:ext uri="{FF2B5EF4-FFF2-40B4-BE49-F238E27FC236}">
-                <a16:creationId xmlns:a16="http://schemas.microsoft.com/office/drawing/2014/main" id="{7ACAB6DB-CD34-41F4-A18D-B6D8F4D12C68}"/>
-              </a:ext>
-            </a:extLst>
-          </p:cNvPr>
-          <p:cNvSpPr txBox="1"/>
-          <p:nvPr/>
-        </p:nvSpPr>
-        <p:spPr>
-          <a:xfrm>
-            <a:off x="0" y="0"/>
-            <a:ext cx="12192000" cy="307777"/>
-          </a:xfrm>
-          <a:prstGeom prst="rect">
-            <a:avLst/>
-          </a:prstGeom>
-          <a:solidFill>
-            <a:schemeClr val="tx1"/>
-          </a:solidFill>
-        </p:spPr>
-        <p:txBody>
-          <a:bodyPr wrap="square">
-            <a:spAutoFit/>
-          </a:bodyPr>
-          <a:lstStyle/>
-          <a:p>
-            <a:r>
-              <a:rPr lang="en-US" sz="1400" b="1" i="0" dirty="0">
-                <a:solidFill>
-                  <a:schemeClr val="bg1"/>
-                </a:solidFill>
-                <a:effectLst/>
-                <a:latin typeface="-apple-system"/>
-              </a:rPr>
-              <a:t>Custom-Tag Dataset with T101389-s1</a:t>
-            </a:r>
-            <a:endParaRPr lang="en-US" sz="1400" dirty="0">
-              <a:solidFill>
-                <a:schemeClr val="bg1"/>
-              </a:solidFill>
-            </a:endParaRPr>
-          </a:p>
-        </p:txBody>
-      </p:sp>
     </p:spTree>
     <p:extLst>
       <p:ext uri="{BB962C8B-B14F-4D97-AF65-F5344CB8AC3E}">
-        <p14:creationId xmlns:p14="http://schemas.microsoft.com/office/powerpoint/2010/main" val="4032223569"/>
+        <p14:creationId xmlns:p14="http://schemas.microsoft.com/office/powerpoint/2010/main" val="3958409367"/>
       </p:ext>
     </p:extLst>
   </p:cSld>
@@ -6232,10 +6502,10 @@
       </p:grpSpPr>
       <p:pic>
         <p:nvPicPr>
-          <p:cNvPr id="4" name="Picture 3">
-            <a:extLst>
-              <a:ext uri="{FF2B5EF4-FFF2-40B4-BE49-F238E27FC236}">
-                <a16:creationId xmlns:a16="http://schemas.microsoft.com/office/drawing/2014/main" id="{EEAD550A-F957-4518-BFDE-5B8DAD68AF45}"/>
+          <p:cNvPr id="3" name="Picture 2">
+            <a:extLst>
+              <a:ext uri="{FF2B5EF4-FFF2-40B4-BE49-F238E27FC236}">
+                <a16:creationId xmlns:a16="http://schemas.microsoft.com/office/drawing/2014/main" id="{0D55F2F9-3A9F-4AD3-BFA9-D30C4EFA4A64}"/>
               </a:ext>
             </a:extLst>
           </p:cNvPr>
@@ -6245,15 +6515,15 @@
           <p:nvPr/>
         </p:nvPicPr>
         <p:blipFill>
-          <a:blip r:embed="rId2"/>
+          <a:blip r:embed="rId3"/>
           <a:stretch>
             <a:fillRect/>
           </a:stretch>
         </p:blipFill>
         <p:spPr>
           <a:xfrm>
-            <a:off x="0" y="766754"/>
-            <a:ext cx="12192000" cy="5324492"/>
+            <a:off x="0" y="323085"/>
+            <a:ext cx="12192000" cy="6211829"/>
           </a:xfrm>
           <a:prstGeom prst="rect">
             <a:avLst/>
@@ -6262,57 +6532,10 @@
       </p:pic>
       <p:sp>
         <p:nvSpPr>
-          <p:cNvPr id="6" name="TextBox 5">
-            <a:extLst>
-              <a:ext uri="{FF2B5EF4-FFF2-40B4-BE49-F238E27FC236}">
-                <a16:creationId xmlns:a16="http://schemas.microsoft.com/office/drawing/2014/main" id="{EBB52298-5DC8-495B-A05C-C8E6A6AE32DD}"/>
-              </a:ext>
-            </a:extLst>
-          </p:cNvPr>
-          <p:cNvSpPr txBox="1"/>
-          <p:nvPr/>
-        </p:nvSpPr>
-        <p:spPr>
-          <a:xfrm>
-            <a:off x="0" y="-12367"/>
-            <a:ext cx="12192000" cy="307777"/>
-          </a:xfrm>
-          <a:prstGeom prst="rect">
-            <a:avLst/>
-          </a:prstGeom>
-          <a:solidFill>
-            <a:schemeClr val="tx1"/>
-          </a:solidFill>
-        </p:spPr>
-        <p:txBody>
-          <a:bodyPr wrap="square">
-            <a:spAutoFit/>
-          </a:bodyPr>
-          <a:lstStyle/>
-          <a:p>
-            <a:r>
-              <a:rPr lang="en-US" sz="1400" b="1" dirty="0">
-                <a:solidFill>
-                  <a:schemeClr val="bg1"/>
-                </a:solidFill>
-                <a:latin typeface="-apple-system"/>
-              </a:rPr>
-              <a:t>Browse for New Dataset (udc-dem2 = T101389-s1) with Visual Query</a:t>
-            </a:r>
-            <a:endParaRPr lang="en-US" sz="1400" dirty="0">
-              <a:solidFill>
-                <a:schemeClr val="bg1"/>
-              </a:solidFill>
-            </a:endParaRPr>
-          </a:p>
-        </p:txBody>
-      </p:sp>
-      <p:sp>
-        <p:nvSpPr>
           <p:cNvPr id="7" name="Arrow: Right 6">
             <a:extLst>
               <a:ext uri="{FF2B5EF4-FFF2-40B4-BE49-F238E27FC236}">
-                <a16:creationId xmlns:a16="http://schemas.microsoft.com/office/drawing/2014/main" id="{507FD1C4-B2B2-4689-B881-CFE28EA42A58}"/>
+                <a16:creationId xmlns:a16="http://schemas.microsoft.com/office/drawing/2014/main" id="{7EED1752-47EE-4DE0-8BBB-B603685938B8}"/>
               </a:ext>
             </a:extLst>
           </p:cNvPr>
@@ -6320,8 +6543,8 @@
           <p:nvPr/>
         </p:nvSpPr>
         <p:spPr>
-          <a:xfrm rot="10800000">
-            <a:off x="5313563" y="4290422"/>
+          <a:xfrm rot="5400000">
+            <a:off x="3548700" y="1686372"/>
             <a:ext cx="374073" cy="290946"/>
           </a:xfrm>
           <a:prstGeom prst="rightArrow">
@@ -6359,114 +6582,10 @@
           </a:p>
         </p:txBody>
       </p:sp>
-      <p:sp>
-        <p:nvSpPr>
-          <p:cNvPr id="9" name="Arrow: Right 8">
-            <a:extLst>
-              <a:ext uri="{FF2B5EF4-FFF2-40B4-BE49-F238E27FC236}">
-                <a16:creationId xmlns:a16="http://schemas.microsoft.com/office/drawing/2014/main" id="{824B4B53-8681-4F6D-8AF1-3F649686EDF5}"/>
-              </a:ext>
-            </a:extLst>
-          </p:cNvPr>
-          <p:cNvSpPr/>
-          <p:nvPr/>
-        </p:nvSpPr>
-        <p:spPr>
-          <a:xfrm rot="10800000">
-            <a:off x="1008263" y="4905061"/>
-            <a:ext cx="374073" cy="290946"/>
-          </a:xfrm>
-          <a:prstGeom prst="rightArrow">
-            <a:avLst/>
-          </a:prstGeom>
-          <a:solidFill>
-            <a:srgbClr val="FF0000"/>
-          </a:solidFill>
-          <a:ln>
-            <a:noFill/>
-          </a:ln>
-        </p:spPr>
-        <p:style>
-          <a:lnRef idx="2">
-            <a:schemeClr val="accent1">
-              <a:shade val="50000"/>
-            </a:schemeClr>
-          </a:lnRef>
-          <a:fillRef idx="1">
-            <a:schemeClr val="accent1"/>
-          </a:fillRef>
-          <a:effectRef idx="0">
-            <a:schemeClr val="accent1"/>
-          </a:effectRef>
-          <a:fontRef idx="minor">
-            <a:schemeClr val="lt1"/>
-          </a:fontRef>
-        </p:style>
-        <p:txBody>
-          <a:bodyPr rtlCol="0" anchor="ctr"/>
-          <a:lstStyle/>
-          <a:p>
-            <a:pPr algn="ctr"/>
-            <a:endParaRPr lang="en-US"/>
-          </a:p>
-        </p:txBody>
-      </p:sp>
-      <p:sp>
-        <p:nvSpPr>
-          <p:cNvPr id="10" name="Arrow: Right 9">
-            <a:extLst>
-              <a:ext uri="{FF2B5EF4-FFF2-40B4-BE49-F238E27FC236}">
-                <a16:creationId xmlns:a16="http://schemas.microsoft.com/office/drawing/2014/main" id="{B98608AE-6DEE-4104-984B-CF1FD8B6CF83}"/>
-              </a:ext>
-            </a:extLst>
-          </p:cNvPr>
-          <p:cNvSpPr/>
-          <p:nvPr/>
-        </p:nvSpPr>
-        <p:spPr>
-          <a:xfrm rot="10800000">
-            <a:off x="9352163" y="4290422"/>
-            <a:ext cx="374073" cy="290946"/>
-          </a:xfrm>
-          <a:prstGeom prst="rightArrow">
-            <a:avLst/>
-          </a:prstGeom>
-          <a:solidFill>
-            <a:srgbClr val="FF0000"/>
-          </a:solidFill>
-          <a:ln>
-            <a:noFill/>
-          </a:ln>
-        </p:spPr>
-        <p:style>
-          <a:lnRef idx="2">
-            <a:schemeClr val="accent1">
-              <a:shade val="50000"/>
-            </a:schemeClr>
-          </a:lnRef>
-          <a:fillRef idx="1">
-            <a:schemeClr val="accent1"/>
-          </a:fillRef>
-          <a:effectRef idx="0">
-            <a:schemeClr val="accent1"/>
-          </a:effectRef>
-          <a:fontRef idx="minor">
-            <a:schemeClr val="lt1"/>
-          </a:fontRef>
-        </p:style>
-        <p:txBody>
-          <a:bodyPr rtlCol="0" anchor="ctr"/>
-          <a:lstStyle/>
-          <a:p>
-            <a:pPr algn="ctr"/>
-            <a:endParaRPr lang="en-US"/>
-          </a:p>
-        </p:txBody>
-      </p:sp>
     </p:spTree>
     <p:extLst>
       <p:ext uri="{BB962C8B-B14F-4D97-AF65-F5344CB8AC3E}">
-        <p14:creationId xmlns:p14="http://schemas.microsoft.com/office/powerpoint/2010/main" val="3147731059"/>
+        <p14:creationId xmlns:p14="http://schemas.microsoft.com/office/powerpoint/2010/main" val="1361910923"/>
       </p:ext>
     </p:extLst>
   </p:cSld>
@@ -6495,10 +6614,10 @@
       </p:grpSpPr>
       <p:pic>
         <p:nvPicPr>
-          <p:cNvPr id="3" name="Picture 2">
-            <a:extLst>
-              <a:ext uri="{FF2B5EF4-FFF2-40B4-BE49-F238E27FC236}">
-                <a16:creationId xmlns:a16="http://schemas.microsoft.com/office/drawing/2014/main" id="{87D35F42-DD92-429B-85A6-8274510FD393}"/>
+          <p:cNvPr id="5" name="Picture 4">
+            <a:extLst>
+              <a:ext uri="{FF2B5EF4-FFF2-40B4-BE49-F238E27FC236}">
+                <a16:creationId xmlns:a16="http://schemas.microsoft.com/office/drawing/2014/main" id="{46525040-87A1-4B40-84CA-A41A59D333F9}"/>
               </a:ext>
             </a:extLst>
           </p:cNvPr>
@@ -6508,15 +6627,15 @@
           <p:nvPr/>
         </p:nvPicPr>
         <p:blipFill>
-          <a:blip r:embed="rId2"/>
+          <a:blip r:embed="rId3"/>
           <a:stretch>
             <a:fillRect/>
           </a:stretch>
         </p:blipFill>
         <p:spPr>
           <a:xfrm>
-            <a:off x="0" y="1338534"/>
-            <a:ext cx="12192000" cy="4180932"/>
+            <a:off x="0" y="149562"/>
+            <a:ext cx="12192000" cy="6558876"/>
           </a:xfrm>
           <a:prstGeom prst="rect">
             <a:avLst/>
@@ -6525,76 +6644,29 @@
       </p:pic>
       <p:sp>
         <p:nvSpPr>
-          <p:cNvPr id="6" name="TextBox 5">
-            <a:extLst>
-              <a:ext uri="{FF2B5EF4-FFF2-40B4-BE49-F238E27FC236}">
-                <a16:creationId xmlns:a16="http://schemas.microsoft.com/office/drawing/2014/main" id="{EBB52298-5DC8-495B-A05C-C8E6A6AE32DD}"/>
-              </a:ext>
-            </a:extLst>
-          </p:cNvPr>
-          <p:cNvSpPr txBox="1"/>
+          <p:cNvPr id="6" name="Rectangle 5">
+            <a:extLst>
+              <a:ext uri="{FF2B5EF4-FFF2-40B4-BE49-F238E27FC236}">
+                <a16:creationId xmlns:a16="http://schemas.microsoft.com/office/drawing/2014/main" id="{7B3FF451-1091-4CA3-9C04-0923BA940C81}"/>
+              </a:ext>
+            </a:extLst>
+          </p:cNvPr>
+          <p:cNvSpPr/>
           <p:nvPr/>
         </p:nvSpPr>
         <p:spPr>
           <a:xfrm>
-            <a:off x="0" y="-12367"/>
-            <a:ext cx="12192000" cy="307777"/>
+            <a:off x="0" y="2055320"/>
+            <a:ext cx="12192000" cy="404280"/>
           </a:xfrm>
           <a:prstGeom prst="rect">
             <a:avLst/>
           </a:prstGeom>
-          <a:solidFill>
-            <a:schemeClr val="tx1"/>
-          </a:solidFill>
-        </p:spPr>
-        <p:txBody>
-          <a:bodyPr wrap="square">
-            <a:spAutoFit/>
-          </a:bodyPr>
-          <a:lstStyle/>
-          <a:p>
-            <a:r>
-              <a:rPr lang="en-US" sz="1400" b="1" dirty="0">
-                <a:solidFill>
-                  <a:schemeClr val="bg1"/>
-                </a:solidFill>
-                <a:latin typeface="-apple-system"/>
-              </a:rPr>
-              <a:t>New Dataset (T101389-s1) Can be Found using a Single-query Search</a:t>
-            </a:r>
-            <a:endParaRPr lang="en-US" sz="1400" dirty="0">
-              <a:solidFill>
-                <a:schemeClr val="bg1"/>
-              </a:solidFill>
-            </a:endParaRPr>
-          </a:p>
-        </p:txBody>
-      </p:sp>
-      <p:sp>
-        <p:nvSpPr>
-          <p:cNvPr id="8" name="Arrow: Right 7">
-            <a:extLst>
-              <a:ext uri="{FF2B5EF4-FFF2-40B4-BE49-F238E27FC236}">
-                <a16:creationId xmlns:a16="http://schemas.microsoft.com/office/drawing/2014/main" id="{D2CBD2C9-CB16-47D3-A408-699606D97716}"/>
-              </a:ext>
-            </a:extLst>
-          </p:cNvPr>
-          <p:cNvSpPr/>
-          <p:nvPr/>
-        </p:nvSpPr>
-        <p:spPr>
-          <a:xfrm>
-            <a:off x="2920189" y="4687004"/>
-            <a:ext cx="374073" cy="290946"/>
-          </a:xfrm>
-          <a:prstGeom prst="rightArrow">
-            <a:avLst/>
-          </a:prstGeom>
-          <a:solidFill>
-            <a:srgbClr val="FF0000"/>
-          </a:solidFill>
-          <a:ln>
-            <a:noFill/>
+          <a:noFill/>
+          <a:ln w="38100">
+            <a:solidFill>
+              <a:srgbClr val="FF0000"/>
+            </a:solidFill>
           </a:ln>
         </p:spPr>
         <p:style>
@@ -6625,7 +6697,7 @@
     </p:spTree>
     <p:extLst>
       <p:ext uri="{BB962C8B-B14F-4D97-AF65-F5344CB8AC3E}">
-        <p14:creationId xmlns:p14="http://schemas.microsoft.com/office/powerpoint/2010/main" val="940409178"/>
+        <p14:creationId xmlns:p14="http://schemas.microsoft.com/office/powerpoint/2010/main" val="1470186142"/>
       </p:ext>
     </p:extLst>
   </p:cSld>
@@ -6636,451 +6708,6 @@
 </file>
 
 <file path=ppt/slides/slide19.xml><?xml version="1.0" encoding="utf-8"?>
-<p:sld xmlns:a="http://schemas.openxmlformats.org/drawingml/2006/main" xmlns:r="http://schemas.openxmlformats.org/officeDocument/2006/relationships" xmlns:p="http://schemas.openxmlformats.org/presentationml/2006/main">
-  <p:cSld>
-    <p:spTree>
-      <p:nvGrpSpPr>
-        <p:cNvPr id="1" name=""/>
-        <p:cNvGrpSpPr/>
-        <p:nvPr/>
-      </p:nvGrpSpPr>
-      <p:grpSpPr>
-        <a:xfrm>
-          <a:off x="0" y="0"/>
-          <a:ext cx="0" cy="0"/>
-          <a:chOff x="0" y="0"/>
-          <a:chExt cx="0" cy="0"/>
-        </a:xfrm>
-      </p:grpSpPr>
-      <p:sp>
-        <p:nvSpPr>
-          <p:cNvPr id="6" name="TextBox 5">
-            <a:extLst>
-              <a:ext uri="{FF2B5EF4-FFF2-40B4-BE49-F238E27FC236}">
-                <a16:creationId xmlns:a16="http://schemas.microsoft.com/office/drawing/2014/main" id="{7A88B84A-7FB5-4C14-8855-A10017599D03}"/>
-              </a:ext>
-            </a:extLst>
-          </p:cNvPr>
-          <p:cNvSpPr txBox="1"/>
-          <p:nvPr/>
-        </p:nvSpPr>
-        <p:spPr>
-          <a:xfrm>
-            <a:off x="0" y="-12367"/>
-            <a:ext cx="12192000" cy="307777"/>
-          </a:xfrm>
-          <a:prstGeom prst="rect">
-            <a:avLst/>
-          </a:prstGeom>
-          <a:solidFill>
-            <a:schemeClr val="tx1"/>
-          </a:solidFill>
-        </p:spPr>
-        <p:txBody>
-          <a:bodyPr wrap="square">
-            <a:spAutoFit/>
-          </a:bodyPr>
-          <a:lstStyle/>
-          <a:p>
-            <a:r>
-              <a:rPr lang="en-US" sz="1400" b="1" dirty="0">
-                <a:solidFill>
-                  <a:schemeClr val="bg1"/>
-                </a:solidFill>
-                <a:latin typeface="-apple-system"/>
-              </a:rPr>
-              <a:t>Generate a Report of the New Dataset as a CSV Manifest</a:t>
-            </a:r>
-            <a:endParaRPr lang="en-US" sz="1400" dirty="0">
-              <a:solidFill>
-                <a:schemeClr val="bg1"/>
-              </a:solidFill>
-            </a:endParaRPr>
-          </a:p>
-        </p:txBody>
-      </p:sp>
-      <p:pic>
-        <p:nvPicPr>
-          <p:cNvPr id="3" name="Picture 2">
-            <a:extLst>
-              <a:ext uri="{FF2B5EF4-FFF2-40B4-BE49-F238E27FC236}">
-                <a16:creationId xmlns:a16="http://schemas.microsoft.com/office/drawing/2014/main" id="{9045C729-9815-45D4-847A-135F2DCEDEED}"/>
-              </a:ext>
-            </a:extLst>
-          </p:cNvPr>
-          <p:cNvPicPr>
-            <a:picLocks noChangeAspect="1"/>
-          </p:cNvPicPr>
-          <p:nvPr/>
-        </p:nvPicPr>
-        <p:blipFill>
-          <a:blip r:embed="rId2"/>
-          <a:stretch>
-            <a:fillRect/>
-          </a:stretch>
-        </p:blipFill>
-        <p:spPr>
-          <a:xfrm>
-            <a:off x="0" y="687750"/>
-            <a:ext cx="12192000" cy="5482499"/>
-          </a:xfrm>
-          <a:prstGeom prst="rect">
-            <a:avLst/>
-          </a:prstGeom>
-        </p:spPr>
-      </p:pic>
-    </p:spTree>
-    <p:extLst>
-      <p:ext uri="{BB962C8B-B14F-4D97-AF65-F5344CB8AC3E}">
-        <p14:creationId xmlns:p14="http://schemas.microsoft.com/office/powerpoint/2010/main" val="3723135412"/>
-      </p:ext>
-    </p:extLst>
-  </p:cSld>
-  <p:clrMapOvr>
-    <a:masterClrMapping/>
-  </p:clrMapOvr>
-</p:sld>
-</file>
-
-<file path=ppt/slides/slide2.xml><?xml version="1.0" encoding="utf-8"?>
-<p:sld xmlns:a="http://schemas.openxmlformats.org/drawingml/2006/main" xmlns:r="http://schemas.openxmlformats.org/officeDocument/2006/relationships" xmlns:p="http://schemas.openxmlformats.org/presentationml/2006/main">
-  <p:cSld>
-    <p:spTree>
-      <p:nvGrpSpPr>
-        <p:cNvPr id="1" name=""/>
-        <p:cNvGrpSpPr/>
-        <p:nvPr/>
-      </p:nvGrpSpPr>
-      <p:grpSpPr>
-        <a:xfrm>
-          <a:off x="0" y="0"/>
-          <a:ext cx="0" cy="0"/>
-          <a:chOff x="0" y="0"/>
-          <a:chExt cx="0" cy="0"/>
-        </a:xfrm>
-      </p:grpSpPr>
-      <p:sp>
-        <p:nvSpPr>
-          <p:cNvPr id="2" name="Title 1">
-            <a:extLst>
-              <a:ext uri="{FF2B5EF4-FFF2-40B4-BE49-F238E27FC236}">
-                <a16:creationId xmlns:a16="http://schemas.microsoft.com/office/drawing/2014/main" id="{E44F8F50-F463-4161-8FE4-2C8AD24AF0A4}"/>
-              </a:ext>
-            </a:extLst>
-          </p:cNvPr>
-          <p:cNvSpPr>
-            <a:spLocks noGrp="1"/>
-          </p:cNvSpPr>
-          <p:nvPr>
-            <p:ph type="title"/>
-          </p:nvPr>
-        </p:nvSpPr>
-        <p:spPr>
-          <a:xfrm>
-            <a:off x="720213" y="3039845"/>
-            <a:ext cx="10515600" cy="778310"/>
-          </a:xfrm>
-        </p:spPr>
-        <p:txBody>
-          <a:bodyPr>
-            <a:normAutofit/>
-          </a:bodyPr>
-          <a:lstStyle/>
-          <a:p>
-            <a:pPr algn="l"/>
-            <a:r>
-              <a:rPr lang="en-US" sz="2800" b="1" i="0" dirty="0">
-                <a:solidFill>
-                  <a:srgbClr val="24292F"/>
-                </a:solidFill>
-                <a:effectLst/>
-                <a:latin typeface="-apple-system"/>
-              </a:rPr>
-              <a:t>1. Set up Spectrum Discover to Manage Data Sources</a:t>
-            </a:r>
-          </a:p>
-        </p:txBody>
-      </p:sp>
-    </p:spTree>
-    <p:extLst>
-      <p:ext uri="{BB962C8B-B14F-4D97-AF65-F5344CB8AC3E}">
-        <p14:creationId xmlns:p14="http://schemas.microsoft.com/office/powerpoint/2010/main" val="2028958019"/>
-      </p:ext>
-    </p:extLst>
-  </p:cSld>
-  <p:clrMapOvr>
-    <a:masterClrMapping/>
-  </p:clrMapOvr>
-</p:sld>
-</file>
-
-<file path=ppt/slides/slide20.xml><?xml version="1.0" encoding="utf-8"?>
-<p:sld xmlns:a="http://schemas.openxmlformats.org/drawingml/2006/main" xmlns:r="http://schemas.openxmlformats.org/officeDocument/2006/relationships" xmlns:p="http://schemas.openxmlformats.org/presentationml/2006/main">
-  <p:cSld>
-    <p:spTree>
-      <p:nvGrpSpPr>
-        <p:cNvPr id="1" name=""/>
-        <p:cNvGrpSpPr/>
-        <p:nvPr/>
-      </p:nvGrpSpPr>
-      <p:grpSpPr>
-        <a:xfrm>
-          <a:off x="0" y="0"/>
-          <a:ext cx="0" cy="0"/>
-          <a:chOff x="0" y="0"/>
-          <a:chExt cx="0" cy="0"/>
-        </a:xfrm>
-      </p:grpSpPr>
-      <p:sp>
-        <p:nvSpPr>
-          <p:cNvPr id="6" name="TextBox 5">
-            <a:extLst>
-              <a:ext uri="{FF2B5EF4-FFF2-40B4-BE49-F238E27FC236}">
-                <a16:creationId xmlns:a16="http://schemas.microsoft.com/office/drawing/2014/main" id="{7A88B84A-7FB5-4C14-8855-A10017599D03}"/>
-              </a:ext>
-            </a:extLst>
-          </p:cNvPr>
-          <p:cNvSpPr txBox="1"/>
-          <p:nvPr/>
-        </p:nvSpPr>
-        <p:spPr>
-          <a:xfrm>
-            <a:off x="0" y="-12367"/>
-            <a:ext cx="12192000" cy="307777"/>
-          </a:xfrm>
-          <a:prstGeom prst="rect">
-            <a:avLst/>
-          </a:prstGeom>
-          <a:solidFill>
-            <a:schemeClr val="tx1"/>
-          </a:solidFill>
-        </p:spPr>
-        <p:txBody>
-          <a:bodyPr wrap="square">
-            <a:spAutoFit/>
-          </a:bodyPr>
-          <a:lstStyle/>
-          <a:p>
-            <a:r>
-              <a:rPr lang="en-US" sz="1400" b="1" dirty="0">
-                <a:solidFill>
-                  <a:schemeClr val="bg1"/>
-                </a:solidFill>
-                <a:latin typeface="-apple-system"/>
-              </a:rPr>
-              <a:t>Export the New Dataset into a Manifest</a:t>
-            </a:r>
-            <a:endParaRPr lang="en-US" sz="1400" dirty="0">
-              <a:solidFill>
-                <a:schemeClr val="bg1"/>
-              </a:solidFill>
-            </a:endParaRPr>
-          </a:p>
-        </p:txBody>
-      </p:sp>
-      <p:pic>
-        <p:nvPicPr>
-          <p:cNvPr id="3" name="Picture 2">
-            <a:extLst>
-              <a:ext uri="{FF2B5EF4-FFF2-40B4-BE49-F238E27FC236}">
-                <a16:creationId xmlns:a16="http://schemas.microsoft.com/office/drawing/2014/main" id="{1CA52EC5-1D41-4190-B3A5-28F973A9D489}"/>
-              </a:ext>
-            </a:extLst>
-          </p:cNvPr>
-          <p:cNvPicPr>
-            <a:picLocks noChangeAspect="1"/>
-          </p:cNvPicPr>
-          <p:nvPr/>
-        </p:nvPicPr>
-        <p:blipFill>
-          <a:blip r:embed="rId2"/>
-          <a:stretch>
-            <a:fillRect/>
-          </a:stretch>
-        </p:blipFill>
-        <p:spPr>
-          <a:xfrm>
-            <a:off x="0" y="587928"/>
-            <a:ext cx="12192000" cy="5682143"/>
-          </a:xfrm>
-          <a:prstGeom prst="rect">
-            <a:avLst/>
-          </a:prstGeom>
-        </p:spPr>
-      </p:pic>
-    </p:spTree>
-    <p:extLst>
-      <p:ext uri="{BB962C8B-B14F-4D97-AF65-F5344CB8AC3E}">
-        <p14:creationId xmlns:p14="http://schemas.microsoft.com/office/powerpoint/2010/main" val="273626421"/>
-      </p:ext>
-    </p:extLst>
-  </p:cSld>
-  <p:clrMapOvr>
-    <a:masterClrMapping/>
-  </p:clrMapOvr>
-</p:sld>
-</file>
-
-<file path=ppt/slides/slide21.xml><?xml version="1.0" encoding="utf-8"?>
-<p:sld xmlns:a="http://schemas.openxmlformats.org/drawingml/2006/main" xmlns:r="http://schemas.openxmlformats.org/officeDocument/2006/relationships" xmlns:p="http://schemas.openxmlformats.org/presentationml/2006/main">
-  <p:cSld>
-    <p:spTree>
-      <p:nvGrpSpPr>
-        <p:cNvPr id="1" name=""/>
-        <p:cNvGrpSpPr/>
-        <p:nvPr/>
-      </p:nvGrpSpPr>
-      <p:grpSpPr>
-        <a:xfrm>
-          <a:off x="0" y="0"/>
-          <a:ext cx="0" cy="0"/>
-          <a:chOff x="0" y="0"/>
-          <a:chExt cx="0" cy="0"/>
-        </a:xfrm>
-      </p:grpSpPr>
-      <p:sp>
-        <p:nvSpPr>
-          <p:cNvPr id="6" name="TextBox 5">
-            <a:extLst>
-              <a:ext uri="{FF2B5EF4-FFF2-40B4-BE49-F238E27FC236}">
-                <a16:creationId xmlns:a16="http://schemas.microsoft.com/office/drawing/2014/main" id="{7A88B84A-7FB5-4C14-8855-A10017599D03}"/>
-              </a:ext>
-            </a:extLst>
-          </p:cNvPr>
-          <p:cNvSpPr txBox="1"/>
-          <p:nvPr/>
-        </p:nvSpPr>
-        <p:spPr>
-          <a:xfrm>
-            <a:off x="0" y="-12367"/>
-            <a:ext cx="12192000" cy="307777"/>
-          </a:xfrm>
-          <a:prstGeom prst="rect">
-            <a:avLst/>
-          </a:prstGeom>
-          <a:solidFill>
-            <a:schemeClr val="tx1"/>
-          </a:solidFill>
-        </p:spPr>
-        <p:txBody>
-          <a:bodyPr wrap="square">
-            <a:spAutoFit/>
-          </a:bodyPr>
-          <a:lstStyle/>
-          <a:p>
-            <a:r>
-              <a:rPr lang="en-US" sz="1400" b="1" dirty="0">
-                <a:solidFill>
-                  <a:schemeClr val="bg1"/>
-                </a:solidFill>
-                <a:latin typeface="-apple-system"/>
-              </a:rPr>
-              <a:t>The Manifest is Stored in Console as Report</a:t>
-            </a:r>
-            <a:endParaRPr lang="en-US" sz="1400" dirty="0">
-              <a:solidFill>
-                <a:schemeClr val="bg1"/>
-              </a:solidFill>
-            </a:endParaRPr>
-          </a:p>
-        </p:txBody>
-      </p:sp>
-      <p:pic>
-        <p:nvPicPr>
-          <p:cNvPr id="4" name="Picture 3">
-            <a:extLst>
-              <a:ext uri="{FF2B5EF4-FFF2-40B4-BE49-F238E27FC236}">
-                <a16:creationId xmlns:a16="http://schemas.microsoft.com/office/drawing/2014/main" id="{C8DB1E08-0B40-4184-B46A-93B52342DD56}"/>
-              </a:ext>
-            </a:extLst>
-          </p:cNvPr>
-          <p:cNvPicPr>
-            <a:picLocks noChangeAspect="1"/>
-          </p:cNvPicPr>
-          <p:nvPr/>
-        </p:nvPicPr>
-        <p:blipFill>
-          <a:blip r:embed="rId2"/>
-          <a:stretch>
-            <a:fillRect/>
-          </a:stretch>
-        </p:blipFill>
-        <p:spPr>
-          <a:xfrm>
-            <a:off x="428624" y="822617"/>
-            <a:ext cx="11534775" cy="5212766"/>
-          </a:xfrm>
-          <a:prstGeom prst="rect">
-            <a:avLst/>
-          </a:prstGeom>
-        </p:spPr>
-      </p:pic>
-      <p:sp>
-        <p:nvSpPr>
-          <p:cNvPr id="7" name="Arrow: Right 6">
-            <a:extLst>
-              <a:ext uri="{FF2B5EF4-FFF2-40B4-BE49-F238E27FC236}">
-                <a16:creationId xmlns:a16="http://schemas.microsoft.com/office/drawing/2014/main" id="{12D6D57E-BB3B-4D15-A535-E9356AB43541}"/>
-              </a:ext>
-            </a:extLst>
-          </p:cNvPr>
-          <p:cNvSpPr/>
-          <p:nvPr/>
-        </p:nvSpPr>
-        <p:spPr>
-          <a:xfrm>
-            <a:off x="228601" y="2505779"/>
-            <a:ext cx="374073" cy="290946"/>
-          </a:xfrm>
-          <a:prstGeom prst="rightArrow">
-            <a:avLst/>
-          </a:prstGeom>
-          <a:solidFill>
-            <a:srgbClr val="FF0000"/>
-          </a:solidFill>
-          <a:ln>
-            <a:noFill/>
-          </a:ln>
-        </p:spPr>
-        <p:style>
-          <a:lnRef idx="2">
-            <a:schemeClr val="accent1">
-              <a:shade val="50000"/>
-            </a:schemeClr>
-          </a:lnRef>
-          <a:fillRef idx="1">
-            <a:schemeClr val="accent1"/>
-          </a:fillRef>
-          <a:effectRef idx="0">
-            <a:schemeClr val="accent1"/>
-          </a:effectRef>
-          <a:fontRef idx="minor">
-            <a:schemeClr val="lt1"/>
-          </a:fontRef>
-        </p:style>
-        <p:txBody>
-          <a:bodyPr rtlCol="0" anchor="ctr"/>
-          <a:lstStyle/>
-          <a:p>
-            <a:pPr algn="ctr"/>
-            <a:endParaRPr lang="en-US"/>
-          </a:p>
-        </p:txBody>
-      </p:sp>
-    </p:spTree>
-    <p:extLst>
-      <p:ext uri="{BB962C8B-B14F-4D97-AF65-F5344CB8AC3E}">
-        <p14:creationId xmlns:p14="http://schemas.microsoft.com/office/powerpoint/2010/main" val="1819822376"/>
-      </p:ext>
-    </p:extLst>
-  </p:cSld>
-  <p:clrMapOvr>
-    <a:masterClrMapping/>
-  </p:clrMapOvr>
-</p:sld>
-</file>
-
-<file path=ppt/slides/slide22.xml><?xml version="1.0" encoding="utf-8"?>
 <p:sld xmlns:a="http://schemas.openxmlformats.org/drawingml/2006/main" xmlns:r="http://schemas.openxmlformats.org/officeDocument/2006/relationships" xmlns:p="http://schemas.openxmlformats.org/presentationml/2006/main">
   <p:cSld>
     <p:spTree>
@@ -7196,7 +6823,7 @@
 </p:sld>
 </file>
 
-<file path=ppt/slides/slide23.xml><?xml version="1.0" encoding="utf-8"?>
+<file path=ppt/slides/slide2.xml><?xml version="1.0" encoding="utf-8"?>
 <p:sld xmlns:a="http://schemas.openxmlformats.org/drawingml/2006/main" xmlns:r="http://schemas.openxmlformats.org/officeDocument/2006/relationships" xmlns:p="http://schemas.openxmlformats.org/presentationml/2006/main">
   <p:cSld>
     <p:spTree>
@@ -7215,6 +6842,78 @@
       </p:grpSpPr>
       <p:sp>
         <p:nvSpPr>
+          <p:cNvPr id="2" name="Title 1">
+            <a:extLst>
+              <a:ext uri="{FF2B5EF4-FFF2-40B4-BE49-F238E27FC236}">
+                <a16:creationId xmlns:a16="http://schemas.microsoft.com/office/drawing/2014/main" id="{E44F8F50-F463-4161-8FE4-2C8AD24AF0A4}"/>
+              </a:ext>
+            </a:extLst>
+          </p:cNvPr>
+          <p:cNvSpPr>
+            <a:spLocks noGrp="1"/>
+          </p:cNvSpPr>
+          <p:nvPr>
+            <p:ph type="title"/>
+          </p:nvPr>
+        </p:nvSpPr>
+        <p:spPr>
+          <a:xfrm>
+            <a:off x="720213" y="3039845"/>
+            <a:ext cx="10515600" cy="778310"/>
+          </a:xfrm>
+        </p:spPr>
+        <p:txBody>
+          <a:bodyPr>
+            <a:normAutofit/>
+          </a:bodyPr>
+          <a:lstStyle/>
+          <a:p>
+            <a:pPr algn="l"/>
+            <a:r>
+              <a:rPr lang="en-US" sz="2800" b="1" i="0" dirty="0">
+                <a:solidFill>
+                  <a:srgbClr val="24292F"/>
+                </a:solidFill>
+                <a:effectLst/>
+                <a:latin typeface="-apple-system"/>
+              </a:rPr>
+              <a:t>1. Set up Spectrum Discover to Manage Data Sources</a:t>
+            </a:r>
+          </a:p>
+        </p:txBody>
+      </p:sp>
+    </p:spTree>
+    <p:extLst>
+      <p:ext uri="{BB962C8B-B14F-4D97-AF65-F5344CB8AC3E}">
+        <p14:creationId xmlns:p14="http://schemas.microsoft.com/office/powerpoint/2010/main" val="2028958019"/>
+      </p:ext>
+    </p:extLst>
+  </p:cSld>
+  <p:clrMapOvr>
+    <a:masterClrMapping/>
+  </p:clrMapOvr>
+</p:sld>
+</file>
+
+<file path=ppt/slides/slide20.xml><?xml version="1.0" encoding="utf-8"?>
+<p:sld xmlns:a="http://schemas.openxmlformats.org/drawingml/2006/main" xmlns:r="http://schemas.openxmlformats.org/officeDocument/2006/relationships" xmlns:p="http://schemas.openxmlformats.org/presentationml/2006/main">
+  <p:cSld>
+    <p:spTree>
+      <p:nvGrpSpPr>
+        <p:cNvPr id="1" name=""/>
+        <p:cNvGrpSpPr/>
+        <p:nvPr/>
+      </p:nvGrpSpPr>
+      <p:grpSpPr>
+        <a:xfrm>
+          <a:off x="0" y="0"/>
+          <a:ext cx="0" cy="0"/>
+          <a:chOff x="0" y="0"/>
+          <a:chExt cx="0" cy="0"/>
+        </a:xfrm>
+      </p:grpSpPr>
+      <p:sp>
+        <p:nvSpPr>
           <p:cNvPr id="5" name="Title 1">
             <a:extLst>
               <a:ext uri="{FF2B5EF4-FFF2-40B4-BE49-F238E27FC236}">
@@ -7306,7 +7005,7 @@
 </p:sld>
 </file>
 
-<file path=ppt/slides/slide24.xml><?xml version="1.0" encoding="utf-8"?>
+<file path=ppt/slides/slide21.xml><?xml version="1.0" encoding="utf-8"?>
 <p:sld xmlns:a="http://schemas.openxmlformats.org/drawingml/2006/main" xmlns:r="http://schemas.openxmlformats.org/officeDocument/2006/relationships" xmlns:p="http://schemas.openxmlformats.org/presentationml/2006/main">
   <p:cSld>
     <p:spTree>
@@ -7447,7 +7146,7 @@
 </p:sld>
 </file>
 
-<file path=ppt/slides/slide25.xml><?xml version="1.0" encoding="utf-8"?>
+<file path=ppt/slides/slide22.xml><?xml version="1.0" encoding="utf-8"?>
 <p:sld xmlns:a="http://schemas.openxmlformats.org/drawingml/2006/main" xmlns:r="http://schemas.openxmlformats.org/officeDocument/2006/relationships" xmlns:p="http://schemas.openxmlformats.org/presentationml/2006/main">
   <p:cSld>
     <p:spTree>
@@ -7588,7 +7287,7 @@
 </p:sld>
 </file>
 
-<file path=ppt/slides/slide26.xml><?xml version="1.0" encoding="utf-8"?>
+<file path=ppt/slides/slide23.xml><?xml version="1.0" encoding="utf-8"?>
 <p:sld xmlns:a="http://schemas.openxmlformats.org/drawingml/2006/main" xmlns:r="http://schemas.openxmlformats.org/officeDocument/2006/relationships" xmlns:p="http://schemas.openxmlformats.org/presentationml/2006/main">
   <p:cSld>
     <p:spTree>
@@ -7648,7 +7347,7 @@
 </p:sld>
 </file>
 
-<file path=ppt/slides/slide27.xml><?xml version="1.0" encoding="utf-8"?>
+<file path=ppt/slides/slide24.xml><?xml version="1.0" encoding="utf-8"?>
 <p:sld xmlns:a="http://schemas.openxmlformats.org/drawingml/2006/main" xmlns:r="http://schemas.openxmlformats.org/officeDocument/2006/relationships" xmlns:p="http://schemas.openxmlformats.org/presentationml/2006/main">
   <p:cSld>
     <p:spTree>
@@ -7789,7 +7488,7 @@
 </p:sld>
 </file>
 
-<file path=ppt/slides/slide28.xml><?xml version="1.0" encoding="utf-8"?>
+<file path=ppt/slides/slide25.xml><?xml version="1.0" encoding="utf-8"?>
 <p:sld xmlns:a="http://schemas.openxmlformats.org/drawingml/2006/main" xmlns:r="http://schemas.openxmlformats.org/officeDocument/2006/relationships" xmlns:p="http://schemas.openxmlformats.org/presentationml/2006/main">
   <p:cSld>
     <p:spTree>
@@ -7880,7 +7579,7 @@
 </p:sld>
 </file>
 
-<file path=ppt/slides/slide29.xml><?xml version="1.0" encoding="utf-8"?>
+<file path=ppt/slides/slide26.xml><?xml version="1.0" encoding="utf-8"?>
 <p:sld xmlns:a="http://schemas.openxmlformats.org/drawingml/2006/main" xmlns:r="http://schemas.openxmlformats.org/officeDocument/2006/relationships" xmlns:p="http://schemas.openxmlformats.org/presentationml/2006/main">
   <p:cSld>
     <p:spTree>
@@ -8096,67 +7795,7 @@
 </p:sld>
 </file>
 
-<file path=ppt/slides/slide3.xml><?xml version="1.0" encoding="utf-8"?>
-<p:sld xmlns:a="http://schemas.openxmlformats.org/drawingml/2006/main" xmlns:r="http://schemas.openxmlformats.org/officeDocument/2006/relationships" xmlns:p="http://schemas.openxmlformats.org/presentationml/2006/main">
-  <p:cSld>
-    <p:spTree>
-      <p:nvGrpSpPr>
-        <p:cNvPr id="1" name=""/>
-        <p:cNvGrpSpPr/>
-        <p:nvPr/>
-      </p:nvGrpSpPr>
-      <p:grpSpPr>
-        <a:xfrm>
-          <a:off x="0" y="0"/>
-          <a:ext cx="0" cy="0"/>
-          <a:chOff x="0" y="0"/>
-          <a:chExt cx="0" cy="0"/>
-        </a:xfrm>
-      </p:grpSpPr>
-      <p:pic>
-        <p:nvPicPr>
-          <p:cNvPr id="5" name="Picture 4">
-            <a:extLst>
-              <a:ext uri="{FF2B5EF4-FFF2-40B4-BE49-F238E27FC236}">
-                <a16:creationId xmlns:a16="http://schemas.microsoft.com/office/drawing/2014/main" id="{48B0A57D-DF37-48C8-8511-A1E59F6E6706}"/>
-              </a:ext>
-            </a:extLst>
-          </p:cNvPr>
-          <p:cNvPicPr>
-            <a:picLocks noChangeAspect="1"/>
-          </p:cNvPicPr>
-          <p:nvPr/>
-        </p:nvPicPr>
-        <p:blipFill>
-          <a:blip r:embed="rId2"/>
-          <a:stretch>
-            <a:fillRect/>
-          </a:stretch>
-        </p:blipFill>
-        <p:spPr>
-          <a:xfrm>
-            <a:off x="-1" y="205843"/>
-            <a:ext cx="12217021" cy="5667055"/>
-          </a:xfrm>
-          <a:prstGeom prst="rect">
-            <a:avLst/>
-          </a:prstGeom>
-        </p:spPr>
-      </p:pic>
-    </p:spTree>
-    <p:extLst>
-      <p:ext uri="{BB962C8B-B14F-4D97-AF65-F5344CB8AC3E}">
-        <p14:creationId xmlns:p14="http://schemas.microsoft.com/office/powerpoint/2010/main" val="1532259498"/>
-      </p:ext>
-    </p:extLst>
-  </p:cSld>
-  <p:clrMapOvr>
-    <a:masterClrMapping/>
-  </p:clrMapOvr>
-</p:sld>
-</file>
-
-<file path=ppt/slides/slide30.xml><?xml version="1.0" encoding="utf-8"?>
+<file path=ppt/slides/slide27.xml><?xml version="1.0" encoding="utf-8"?>
 <p:sld xmlns:a="http://schemas.openxmlformats.org/drawingml/2006/main" xmlns:r="http://schemas.openxmlformats.org/officeDocument/2006/relationships" xmlns:p="http://schemas.openxmlformats.org/presentationml/2006/main">
   <p:cSld>
     <p:spTree>
@@ -8311,6 +7950,66 @@
     <p:extLst>
       <p:ext uri="{BB962C8B-B14F-4D97-AF65-F5344CB8AC3E}">
         <p14:creationId xmlns:p14="http://schemas.microsoft.com/office/powerpoint/2010/main" val="220587786"/>
+      </p:ext>
+    </p:extLst>
+  </p:cSld>
+  <p:clrMapOvr>
+    <a:masterClrMapping/>
+  </p:clrMapOvr>
+</p:sld>
+</file>
+
+<file path=ppt/slides/slide3.xml><?xml version="1.0" encoding="utf-8"?>
+<p:sld xmlns:a="http://schemas.openxmlformats.org/drawingml/2006/main" xmlns:r="http://schemas.openxmlformats.org/officeDocument/2006/relationships" xmlns:p="http://schemas.openxmlformats.org/presentationml/2006/main">
+  <p:cSld>
+    <p:spTree>
+      <p:nvGrpSpPr>
+        <p:cNvPr id="1" name=""/>
+        <p:cNvGrpSpPr/>
+        <p:nvPr/>
+      </p:nvGrpSpPr>
+      <p:grpSpPr>
+        <a:xfrm>
+          <a:off x="0" y="0"/>
+          <a:ext cx="0" cy="0"/>
+          <a:chOff x="0" y="0"/>
+          <a:chExt cx="0" cy="0"/>
+        </a:xfrm>
+      </p:grpSpPr>
+      <p:pic>
+        <p:nvPicPr>
+          <p:cNvPr id="5" name="Picture 4">
+            <a:extLst>
+              <a:ext uri="{FF2B5EF4-FFF2-40B4-BE49-F238E27FC236}">
+                <a16:creationId xmlns:a16="http://schemas.microsoft.com/office/drawing/2014/main" id="{48B0A57D-DF37-48C8-8511-A1E59F6E6706}"/>
+              </a:ext>
+            </a:extLst>
+          </p:cNvPr>
+          <p:cNvPicPr>
+            <a:picLocks noChangeAspect="1"/>
+          </p:cNvPicPr>
+          <p:nvPr/>
+        </p:nvPicPr>
+        <p:blipFill>
+          <a:blip r:embed="rId2"/>
+          <a:stretch>
+            <a:fillRect/>
+          </a:stretch>
+        </p:blipFill>
+        <p:spPr>
+          <a:xfrm>
+            <a:off x="-1" y="205843"/>
+            <a:ext cx="12217021" cy="5667055"/>
+          </a:xfrm>
+          <a:prstGeom prst="rect">
+            <a:avLst/>
+          </a:prstGeom>
+        </p:spPr>
+      </p:pic>
+    </p:spTree>
+    <p:extLst>
+      <p:ext uri="{BB962C8B-B14F-4D97-AF65-F5344CB8AC3E}">
+        <p14:creationId xmlns:p14="http://schemas.microsoft.com/office/powerpoint/2010/main" val="1532259498"/>
       </p:ext>
     </p:extLst>
   </p:cSld>

</xml_diff>

<commit_message>
updated s1 w new screenshot of s1-4
</commit_message>
<xml_diff>
--- a/scenario1/rm/T101389-s1-v20210928.pptx
+++ b/scenario1/rm/T101389-s1-v20210928.pptx
@@ -5,7 +5,7 @@
     <p:sldMasterId id="2147483648" r:id="rId1"/>
   </p:sldMasterIdLst>
   <p:notesMasterIdLst>
-    <p:notesMasterId r:id="rId29"/>
+    <p:notesMasterId r:id="rId30"/>
   </p:notesMasterIdLst>
   <p:sldIdLst>
     <p:sldId id="256" r:id="rId2"/>
@@ -22,19 +22,20 @@
     <p:sldId id="273" r:id="rId13"/>
     <p:sldId id="288" r:id="rId14"/>
     <p:sldId id="274" r:id="rId15"/>
-    <p:sldId id="291" r:id="rId16"/>
-    <p:sldId id="292" r:id="rId17"/>
-    <p:sldId id="293" r:id="rId18"/>
-    <p:sldId id="294" r:id="rId19"/>
-    <p:sldId id="278" r:id="rId20"/>
-    <p:sldId id="286" r:id="rId21"/>
-    <p:sldId id="258" r:id="rId22"/>
-    <p:sldId id="283" r:id="rId23"/>
-    <p:sldId id="284" r:id="rId24"/>
-    <p:sldId id="285" r:id="rId25"/>
-    <p:sldId id="287" r:id="rId26"/>
-    <p:sldId id="280" r:id="rId27"/>
-    <p:sldId id="279" r:id="rId28"/>
+    <p:sldId id="295" r:id="rId16"/>
+    <p:sldId id="291" r:id="rId17"/>
+    <p:sldId id="292" r:id="rId18"/>
+    <p:sldId id="293" r:id="rId19"/>
+    <p:sldId id="294" r:id="rId20"/>
+    <p:sldId id="278" r:id="rId21"/>
+    <p:sldId id="286" r:id="rId22"/>
+    <p:sldId id="258" r:id="rId23"/>
+    <p:sldId id="283" r:id="rId24"/>
+    <p:sldId id="284" r:id="rId25"/>
+    <p:sldId id="285" r:id="rId26"/>
+    <p:sldId id="287" r:id="rId27"/>
+    <p:sldId id="280" r:id="rId28"/>
+    <p:sldId id="279" r:id="rId29"/>
   </p:sldIdLst>
   <p:sldSz cx="12192000" cy="6858000"/>
   <p:notesSz cx="6858000" cy="9144000"/>
@@ -620,7 +621,7 @@
           <a:p>
             <a:r>
               <a:rPr lang="en-US" dirty="0"/>
-              <a:t>E1016404-10-autotag-policy-added</a:t>
+              <a:t>T101389-s1-exporttomanifest2</a:t>
             </a:r>
           </a:p>
         </p:txBody>
@@ -640,78 +641,18 @@
           <a:bodyPr/>
           <a:lstStyle/>
           <a:p>
-            <a:pPr marL="0" marR="0" lvl="0" indent="0" algn="r" defTabSz="914400" rtl="0" eaLnBrk="1" fontAlgn="auto" latinLnBrk="0" hangingPunct="1">
-              <a:lnSpc>
-                <a:spcPct val="100000"/>
-              </a:lnSpc>
-              <a:spcBef>
-                <a:spcPts val="0"/>
-              </a:spcBef>
-              <a:spcAft>
-                <a:spcPts val="0"/>
-              </a:spcAft>
-              <a:buClrTx/>
-              <a:buSzTx/>
-              <a:buFontTx/>
-              <a:buNone/>
-              <a:tabLst/>
-              <a:defRPr/>
-            </a:pPr>
-            <a:fld id="{C37639F4-367D-4C6D-AF3D-3EF385521B21}" type="slidenum">
-              <a:rPr kumimoji="0" lang="en-US" sz="1200" b="0" i="0" u="none" strike="noStrike" kern="1200" cap="none" spc="0" normalizeH="0" baseline="0" noProof="0" smtClean="0">
-                <a:ln>
-                  <a:noFill/>
-                </a:ln>
-                <a:solidFill>
-                  <a:prstClr val="black"/>
-                </a:solidFill>
-                <a:effectLst/>
-                <a:uLnTx/>
-                <a:uFillTx/>
-                <a:latin typeface="Calibri" panose="020F0502020204030204"/>
-                <a:ea typeface="+mn-ea"/>
-                <a:cs typeface="+mn-cs"/>
-              </a:rPr>
-              <a:pPr marL="0" marR="0" lvl="0" indent="0" algn="r" defTabSz="914400" rtl="0" eaLnBrk="1" fontAlgn="auto" latinLnBrk="0" hangingPunct="1">
-                <a:lnSpc>
-                  <a:spcPct val="100000"/>
-                </a:lnSpc>
-                <a:spcBef>
-                  <a:spcPts val="0"/>
-                </a:spcBef>
-                <a:spcAft>
-                  <a:spcPts val="0"/>
-                </a:spcAft>
-                <a:buClrTx/>
-                <a:buSzTx/>
-                <a:buFontTx/>
-                <a:buNone/>
-                <a:tabLst/>
-                <a:defRPr/>
-              </a:pPr>
-              <a:t>21</a:t>
+            <a:fld id="{7FE50167-558C-4D4E-A218-0F44CB45BE81}" type="slidenum">
+              <a:rPr lang="en-US" smtClean="0"/>
+              <a:t>18</a:t>
             </a:fld>
-            <a:endParaRPr kumimoji="0" lang="en-US" sz="1200" b="0" i="0" u="none" strike="noStrike" kern="1200" cap="none" spc="0" normalizeH="0" baseline="0" noProof="0">
-              <a:ln>
-                <a:noFill/>
-              </a:ln>
-              <a:solidFill>
-                <a:prstClr val="black"/>
-              </a:solidFill>
-              <a:effectLst/>
-              <a:uLnTx/>
-              <a:uFillTx/>
-              <a:latin typeface="Calibri" panose="020F0502020204030204"/>
-              <a:ea typeface="+mn-ea"/>
-              <a:cs typeface="+mn-cs"/>
-            </a:endParaRPr>
+            <a:endParaRPr lang="en-US"/>
           </a:p>
         </p:txBody>
       </p:sp>
     </p:spTree>
     <p:extLst>
       <p:ext uri="{BB962C8B-B14F-4D97-AF65-F5344CB8AC3E}">
-        <p14:creationId xmlns:p14="http://schemas.microsoft.com/office/powerpoint/2010/main" val="1298336431"/>
+        <p14:creationId xmlns:p14="http://schemas.microsoft.com/office/powerpoint/2010/main" val="4083586629"/>
       </p:ext>
     </p:extLst>
   </p:cSld>
@@ -765,9 +706,113 @@
           <a:bodyPr/>
           <a:lstStyle/>
           <a:p>
+            <a:pPr marL="0" marR="0" lvl="0" indent="0" algn="l" defTabSz="914400" rtl="0" eaLnBrk="1" fontAlgn="auto" latinLnBrk="0" hangingPunct="1">
+              <a:lnSpc>
+                <a:spcPct val="100000"/>
+              </a:lnSpc>
+              <a:spcBef>
+                <a:spcPts val="0"/>
+              </a:spcBef>
+              <a:spcAft>
+                <a:spcPts val="0"/>
+              </a:spcAft>
+              <a:buClrTx/>
+              <a:buSzTx/>
+              <a:buFontTx/>
+              <a:buNone/>
+              <a:tabLst/>
+              <a:defRPr/>
+            </a:pPr>
             <a:r>
               <a:rPr lang="en-US" dirty="0"/>
-              <a:t>E1016404-20-autotag-policy-run-completed</a:t>
+              <a:t>T101389-s1-04-manifest-report-stored-in-discover</a:t>
+            </a:r>
+          </a:p>
+        </p:txBody>
+      </p:sp>
+      <p:sp>
+        <p:nvSpPr>
+          <p:cNvPr id="4" name="Slide Number Placeholder 3"/>
+          <p:cNvSpPr>
+            <a:spLocks noGrp="1"/>
+          </p:cNvSpPr>
+          <p:nvPr>
+            <p:ph type="sldNum" sz="quarter" idx="5"/>
+          </p:nvPr>
+        </p:nvSpPr>
+        <p:spPr/>
+        <p:txBody>
+          <a:bodyPr/>
+          <a:lstStyle/>
+          <a:p>
+            <a:fld id="{7FE50167-558C-4D4E-A218-0F44CB45BE81}" type="slidenum">
+              <a:rPr lang="en-US" smtClean="0"/>
+              <a:t>19</a:t>
+            </a:fld>
+            <a:endParaRPr lang="en-US"/>
+          </a:p>
+        </p:txBody>
+      </p:sp>
+    </p:spTree>
+    <p:extLst>
+      <p:ext uri="{BB962C8B-B14F-4D97-AF65-F5344CB8AC3E}">
+        <p14:creationId xmlns:p14="http://schemas.microsoft.com/office/powerpoint/2010/main" val="2515915617"/>
+      </p:ext>
+    </p:extLst>
+  </p:cSld>
+  <p:clrMapOvr>
+    <a:masterClrMapping/>
+  </p:clrMapOvr>
+</p:notes>
+</file>
+
+<file path=ppt/notesSlides/notesSlide12.xml><?xml version="1.0" encoding="utf-8"?>
+<p:notes xmlns:a="http://schemas.openxmlformats.org/drawingml/2006/main" xmlns:r="http://schemas.openxmlformats.org/officeDocument/2006/relationships" xmlns:p="http://schemas.openxmlformats.org/presentationml/2006/main">
+  <p:cSld>
+    <p:spTree>
+      <p:nvGrpSpPr>
+        <p:cNvPr id="1" name=""/>
+        <p:cNvGrpSpPr/>
+        <p:nvPr/>
+      </p:nvGrpSpPr>
+      <p:grpSpPr>
+        <a:xfrm>
+          <a:off x="0" y="0"/>
+          <a:ext cx="0" cy="0"/>
+          <a:chOff x="0" y="0"/>
+          <a:chExt cx="0" cy="0"/>
+        </a:xfrm>
+      </p:grpSpPr>
+      <p:sp>
+        <p:nvSpPr>
+          <p:cNvPr id="2" name="Slide Image Placeholder 1"/>
+          <p:cNvSpPr>
+            <a:spLocks noGrp="1" noRot="1" noChangeAspect="1"/>
+          </p:cNvSpPr>
+          <p:nvPr>
+            <p:ph type="sldImg"/>
+          </p:nvPr>
+        </p:nvSpPr>
+        <p:spPr/>
+      </p:sp>
+      <p:sp>
+        <p:nvSpPr>
+          <p:cNvPr id="3" name="Notes Placeholder 2"/>
+          <p:cNvSpPr>
+            <a:spLocks noGrp="1"/>
+          </p:cNvSpPr>
+          <p:nvPr>
+            <p:ph type="body" idx="1"/>
+          </p:nvPr>
+        </p:nvSpPr>
+        <p:spPr/>
+        <p:txBody>
+          <a:bodyPr/>
+          <a:lstStyle/>
+          <a:p>
+            <a:r>
+              <a:rPr lang="en-US" dirty="0"/>
+              <a:t>E1016404-10-autotag-policy-added</a:t>
             </a:r>
           </a:p>
         </p:txBody>
@@ -858,7 +903,7 @@
     </p:spTree>
     <p:extLst>
       <p:ext uri="{BB962C8B-B14F-4D97-AF65-F5344CB8AC3E}">
-        <p14:creationId xmlns:p14="http://schemas.microsoft.com/office/powerpoint/2010/main" val="3273163760"/>
+        <p14:creationId xmlns:p14="http://schemas.microsoft.com/office/powerpoint/2010/main" val="1298336431"/>
       </p:ext>
     </p:extLst>
   </p:cSld>
@@ -868,7 +913,7 @@
 </p:notes>
 </file>
 
-<file path=ppt/notesSlides/notesSlide12.xml><?xml version="1.0" encoding="utf-8"?>
+<file path=ppt/notesSlides/notesSlide13.xml><?xml version="1.0" encoding="utf-8"?>
 <p:notes xmlns:a="http://schemas.openxmlformats.org/drawingml/2006/main" xmlns:r="http://schemas.openxmlformats.org/officeDocument/2006/relationships" xmlns:p="http://schemas.openxmlformats.org/presentationml/2006/main">
   <p:cSld>
     <p:spTree>
@@ -912,26 +957,9 @@
           <a:bodyPr/>
           <a:lstStyle/>
           <a:p>
-            <a:pPr marL="0" marR="0" lvl="0" indent="0" algn="l" defTabSz="914400" rtl="0" eaLnBrk="1" fontAlgn="auto" latinLnBrk="0" hangingPunct="1">
-              <a:lnSpc>
-                <a:spcPct val="100000"/>
-              </a:lnSpc>
-              <a:spcBef>
-                <a:spcPts val="0"/>
-              </a:spcBef>
-              <a:spcAft>
-                <a:spcPts val="0"/>
-              </a:spcAft>
-              <a:buClrTx/>
-              <a:buSzTx/>
-              <a:buFontTx/>
-              <a:buNone/>
-              <a:tabLst/>
-              <a:defRPr/>
-            </a:pPr>
             <a:r>
               <a:rPr lang="en-US" dirty="0"/>
-              <a:t>E1016404-30-query-for-new-dataset</a:t>
+              <a:t>E1016404-20-autotag-policy-run-completed</a:t>
             </a:r>
           </a:p>
         </p:txBody>
@@ -1022,7 +1050,7 @@
     </p:spTree>
     <p:extLst>
       <p:ext uri="{BB962C8B-B14F-4D97-AF65-F5344CB8AC3E}">
-        <p14:creationId xmlns:p14="http://schemas.microsoft.com/office/powerpoint/2010/main" val="2482503278"/>
+        <p14:creationId xmlns:p14="http://schemas.microsoft.com/office/powerpoint/2010/main" val="3273163760"/>
       </p:ext>
     </p:extLst>
   </p:cSld>
@@ -1032,7 +1060,7 @@
 </p:notes>
 </file>
 
-<file path=ppt/notesSlides/notesSlide13.xml><?xml version="1.0" encoding="utf-8"?>
+<file path=ppt/notesSlides/notesSlide14.xml><?xml version="1.0" encoding="utf-8"?>
 <p:notes xmlns:a="http://schemas.openxmlformats.org/drawingml/2006/main" xmlns:r="http://schemas.openxmlformats.org/officeDocument/2006/relationships" xmlns:p="http://schemas.openxmlformats.org/presentationml/2006/main">
   <p:cSld>
     <p:spTree>
@@ -1095,7 +1123,7 @@
             </a:pPr>
             <a:r>
               <a:rPr lang="en-US" dirty="0"/>
-              <a:t>E1016404-40-new-dataset-w-calculated-tag</a:t>
+              <a:t>E1016404-30-query-for-new-dataset</a:t>
             </a:r>
           </a:p>
         </p:txBody>
@@ -1186,6 +1214,170 @@
     </p:spTree>
     <p:extLst>
       <p:ext uri="{BB962C8B-B14F-4D97-AF65-F5344CB8AC3E}">
+        <p14:creationId xmlns:p14="http://schemas.microsoft.com/office/powerpoint/2010/main" val="2482503278"/>
+      </p:ext>
+    </p:extLst>
+  </p:cSld>
+  <p:clrMapOvr>
+    <a:masterClrMapping/>
+  </p:clrMapOvr>
+</p:notes>
+</file>
+
+<file path=ppt/notesSlides/notesSlide15.xml><?xml version="1.0" encoding="utf-8"?>
+<p:notes xmlns:a="http://schemas.openxmlformats.org/drawingml/2006/main" xmlns:r="http://schemas.openxmlformats.org/officeDocument/2006/relationships" xmlns:p="http://schemas.openxmlformats.org/presentationml/2006/main">
+  <p:cSld>
+    <p:spTree>
+      <p:nvGrpSpPr>
+        <p:cNvPr id="1" name=""/>
+        <p:cNvGrpSpPr/>
+        <p:nvPr/>
+      </p:nvGrpSpPr>
+      <p:grpSpPr>
+        <a:xfrm>
+          <a:off x="0" y="0"/>
+          <a:ext cx="0" cy="0"/>
+          <a:chOff x="0" y="0"/>
+          <a:chExt cx="0" cy="0"/>
+        </a:xfrm>
+      </p:grpSpPr>
+      <p:sp>
+        <p:nvSpPr>
+          <p:cNvPr id="2" name="Slide Image Placeholder 1"/>
+          <p:cNvSpPr>
+            <a:spLocks noGrp="1" noRot="1" noChangeAspect="1"/>
+          </p:cNvSpPr>
+          <p:nvPr>
+            <p:ph type="sldImg"/>
+          </p:nvPr>
+        </p:nvSpPr>
+        <p:spPr/>
+      </p:sp>
+      <p:sp>
+        <p:nvSpPr>
+          <p:cNvPr id="3" name="Notes Placeholder 2"/>
+          <p:cNvSpPr>
+            <a:spLocks noGrp="1"/>
+          </p:cNvSpPr>
+          <p:nvPr>
+            <p:ph type="body" idx="1"/>
+          </p:nvPr>
+        </p:nvSpPr>
+        <p:spPr/>
+        <p:txBody>
+          <a:bodyPr/>
+          <a:lstStyle/>
+          <a:p>
+            <a:pPr marL="0" marR="0" lvl="0" indent="0" algn="l" defTabSz="914400" rtl="0" eaLnBrk="1" fontAlgn="auto" latinLnBrk="0" hangingPunct="1">
+              <a:lnSpc>
+                <a:spcPct val="100000"/>
+              </a:lnSpc>
+              <a:spcBef>
+                <a:spcPts val="0"/>
+              </a:spcBef>
+              <a:spcAft>
+                <a:spcPts val="0"/>
+              </a:spcAft>
+              <a:buClrTx/>
+              <a:buSzTx/>
+              <a:buFontTx/>
+              <a:buNone/>
+              <a:tabLst/>
+              <a:defRPr/>
+            </a:pPr>
+            <a:r>
+              <a:rPr lang="en-US" dirty="0"/>
+              <a:t>E1016404-40-new-dataset-w-calculated-tag</a:t>
+            </a:r>
+          </a:p>
+        </p:txBody>
+      </p:sp>
+      <p:sp>
+        <p:nvSpPr>
+          <p:cNvPr id="4" name="Slide Number Placeholder 3"/>
+          <p:cNvSpPr>
+            <a:spLocks noGrp="1"/>
+          </p:cNvSpPr>
+          <p:nvPr>
+            <p:ph type="sldNum" sz="quarter" idx="5"/>
+          </p:nvPr>
+        </p:nvSpPr>
+        <p:spPr/>
+        <p:txBody>
+          <a:bodyPr/>
+          <a:lstStyle/>
+          <a:p>
+            <a:pPr marL="0" marR="0" lvl="0" indent="0" algn="r" defTabSz="914400" rtl="0" eaLnBrk="1" fontAlgn="auto" latinLnBrk="0" hangingPunct="1">
+              <a:lnSpc>
+                <a:spcPct val="100000"/>
+              </a:lnSpc>
+              <a:spcBef>
+                <a:spcPts val="0"/>
+              </a:spcBef>
+              <a:spcAft>
+                <a:spcPts val="0"/>
+              </a:spcAft>
+              <a:buClrTx/>
+              <a:buSzTx/>
+              <a:buFontTx/>
+              <a:buNone/>
+              <a:tabLst/>
+              <a:defRPr/>
+            </a:pPr>
+            <a:fld id="{C37639F4-367D-4C6D-AF3D-3EF385521B21}" type="slidenum">
+              <a:rPr kumimoji="0" lang="en-US" sz="1200" b="0" i="0" u="none" strike="noStrike" kern="1200" cap="none" spc="0" normalizeH="0" baseline="0" noProof="0" smtClean="0">
+                <a:ln>
+                  <a:noFill/>
+                </a:ln>
+                <a:solidFill>
+                  <a:prstClr val="black"/>
+                </a:solidFill>
+                <a:effectLst/>
+                <a:uLnTx/>
+                <a:uFillTx/>
+                <a:latin typeface="Calibri" panose="020F0502020204030204"/>
+                <a:ea typeface="+mn-ea"/>
+                <a:cs typeface="+mn-cs"/>
+              </a:rPr>
+              <a:pPr marL="0" marR="0" lvl="0" indent="0" algn="r" defTabSz="914400" rtl="0" eaLnBrk="1" fontAlgn="auto" latinLnBrk="0" hangingPunct="1">
+                <a:lnSpc>
+                  <a:spcPct val="100000"/>
+                </a:lnSpc>
+                <a:spcBef>
+                  <a:spcPts val="0"/>
+                </a:spcBef>
+                <a:spcAft>
+                  <a:spcPts val="0"/>
+                </a:spcAft>
+                <a:buClrTx/>
+                <a:buSzTx/>
+                <a:buFontTx/>
+                <a:buNone/>
+                <a:tabLst/>
+                <a:defRPr/>
+              </a:pPr>
+              <a:t>25</a:t>
+            </a:fld>
+            <a:endParaRPr kumimoji="0" lang="en-US" sz="1200" b="0" i="0" u="none" strike="noStrike" kern="1200" cap="none" spc="0" normalizeH="0" baseline="0" noProof="0">
+              <a:ln>
+                <a:noFill/>
+              </a:ln>
+              <a:solidFill>
+                <a:prstClr val="black"/>
+              </a:solidFill>
+              <a:effectLst/>
+              <a:uLnTx/>
+              <a:uFillTx/>
+              <a:latin typeface="Calibri" panose="020F0502020204030204"/>
+              <a:ea typeface="+mn-ea"/>
+              <a:cs typeface="+mn-cs"/>
+            </a:endParaRPr>
+          </a:p>
+        </p:txBody>
+      </p:sp>
+    </p:spTree>
+    <p:extLst>
+      <p:ext uri="{BB962C8B-B14F-4D97-AF65-F5344CB8AC3E}">
         <p14:creationId xmlns:p14="http://schemas.microsoft.com/office/powerpoint/2010/main" val="4023775969"/>
       </p:ext>
     </p:extLst>
@@ -1513,7 +1705,7 @@
           <a:p>
             <a:fld id="{7FE50167-558C-4D4E-A218-0F44CB45BE81}" type="slidenum">
               <a:rPr lang="en-US" smtClean="0"/>
-              <a:t>14</a:t>
+              <a:t>13</a:t>
             </a:fld>
             <a:endParaRPr lang="en-US"/>
           </a:p>
@@ -1522,7 +1714,7 @@
     </p:spTree>
     <p:extLst>
       <p:ext uri="{BB962C8B-B14F-4D97-AF65-F5344CB8AC3E}">
-        <p14:creationId xmlns:p14="http://schemas.microsoft.com/office/powerpoint/2010/main" val="1723431945"/>
+        <p14:creationId xmlns:p14="http://schemas.microsoft.com/office/powerpoint/2010/main" val="1620639148"/>
       </p:ext>
     </p:extLst>
   </p:cSld>
@@ -1576,9 +1768,26 @@
           <a:bodyPr/>
           <a:lstStyle/>
           <a:p>
+            <a:pPr marL="0" marR="0" lvl="0" indent="0" algn="l" defTabSz="914400" rtl="0" eaLnBrk="1" fontAlgn="auto" latinLnBrk="0" hangingPunct="1">
+              <a:lnSpc>
+                <a:spcPct val="100000"/>
+              </a:lnSpc>
+              <a:spcBef>
+                <a:spcPts val="0"/>
+              </a:spcBef>
+              <a:spcAft>
+                <a:spcPts val="0"/>
+              </a:spcAft>
+              <a:buClrTx/>
+              <a:buSzTx/>
+              <a:buFontTx/>
+              <a:buNone/>
+              <a:tabLst/>
+              <a:defRPr/>
+            </a:pPr>
             <a:r>
               <a:rPr lang="en-US" dirty="0"/>
-              <a:t>T101389-s1-customtagnewdataset</a:t>
+              <a:t>T101389-s1-04-select-files-to-add-tags</a:t>
             </a:r>
           </a:p>
         </p:txBody>
@@ -1600,7 +1809,7 @@
           <a:p>
             <a:fld id="{7FE50167-558C-4D4E-A218-0F44CB45BE81}" type="slidenum">
               <a:rPr lang="en-US" smtClean="0"/>
-              <a:t>15</a:t>
+              <a:t>14</a:t>
             </a:fld>
             <a:endParaRPr lang="en-US"/>
           </a:p>
@@ -1609,7 +1818,7 @@
     </p:spTree>
     <p:extLst>
       <p:ext uri="{BB962C8B-B14F-4D97-AF65-F5344CB8AC3E}">
-        <p14:creationId xmlns:p14="http://schemas.microsoft.com/office/powerpoint/2010/main" val="3574965043"/>
+        <p14:creationId xmlns:p14="http://schemas.microsoft.com/office/powerpoint/2010/main" val="1723431945"/>
       </p:ext>
     </p:extLst>
   </p:cSld>
@@ -1663,9 +1872,26 @@
           <a:bodyPr/>
           <a:lstStyle/>
           <a:p>
+            <a:pPr marL="0" marR="0" lvl="0" indent="0" algn="l" defTabSz="914400" rtl="0" eaLnBrk="1" fontAlgn="auto" latinLnBrk="0" hangingPunct="1">
+              <a:lnSpc>
+                <a:spcPct val="100000"/>
+              </a:lnSpc>
+              <a:spcBef>
+                <a:spcPts val="0"/>
+              </a:spcBef>
+              <a:spcAft>
+                <a:spcPts val="0"/>
+              </a:spcAft>
+              <a:buClrTx/>
+              <a:buSzTx/>
+              <a:buFontTx/>
+              <a:buNone/>
+              <a:tabLst/>
+              <a:defRPr/>
+            </a:pPr>
             <a:r>
               <a:rPr lang="en-US" dirty="0"/>
-              <a:t>T101389-s1-exporttomanifest</a:t>
+              <a:t>T101389-s1-04-add-cutom-tag</a:t>
             </a:r>
           </a:p>
         </p:txBody>
@@ -1687,7 +1913,7 @@
           <a:p>
             <a:fld id="{7FE50167-558C-4D4E-A218-0F44CB45BE81}" type="slidenum">
               <a:rPr lang="en-US" smtClean="0"/>
-              <a:t>16</a:t>
+              <a:t>15</a:t>
             </a:fld>
             <a:endParaRPr lang="en-US"/>
           </a:p>
@@ -1696,7 +1922,7 @@
     </p:spTree>
     <p:extLst>
       <p:ext uri="{BB962C8B-B14F-4D97-AF65-F5344CB8AC3E}">
-        <p14:creationId xmlns:p14="http://schemas.microsoft.com/office/powerpoint/2010/main" val="520174725"/>
+        <p14:creationId xmlns:p14="http://schemas.microsoft.com/office/powerpoint/2010/main" val="560175488"/>
       </p:ext>
     </p:extLst>
   </p:cSld>
@@ -1752,7 +1978,7 @@
           <a:p>
             <a:r>
               <a:rPr lang="en-US" dirty="0"/>
-              <a:t>T101389-s1-exporttomanifest2</a:t>
+              <a:t>T101389-s1-customtagnewdataset</a:t>
             </a:r>
           </a:p>
         </p:txBody>
@@ -1774,7 +2000,7 @@
           <a:p>
             <a:fld id="{7FE50167-558C-4D4E-A218-0F44CB45BE81}" type="slidenum">
               <a:rPr lang="en-US" smtClean="0"/>
-              <a:t>17</a:t>
+              <a:t>16</a:t>
             </a:fld>
             <a:endParaRPr lang="en-US"/>
           </a:p>
@@ -1783,7 +2009,7 @@
     </p:spTree>
     <p:extLst>
       <p:ext uri="{BB962C8B-B14F-4D97-AF65-F5344CB8AC3E}">
-        <p14:creationId xmlns:p14="http://schemas.microsoft.com/office/powerpoint/2010/main" val="4083586629"/>
+        <p14:creationId xmlns:p14="http://schemas.microsoft.com/office/powerpoint/2010/main" val="3574965043"/>
       </p:ext>
     </p:extLst>
   </p:cSld>
@@ -1837,26 +2063,9 @@
           <a:bodyPr/>
           <a:lstStyle/>
           <a:p>
-            <a:pPr marL="0" marR="0" lvl="0" indent="0" algn="l" defTabSz="914400" rtl="0" eaLnBrk="1" fontAlgn="auto" latinLnBrk="0" hangingPunct="1">
-              <a:lnSpc>
-                <a:spcPct val="100000"/>
-              </a:lnSpc>
-              <a:spcBef>
-                <a:spcPts val="0"/>
-              </a:spcBef>
-              <a:spcAft>
-                <a:spcPts val="0"/>
-              </a:spcAft>
-              <a:buClrTx/>
-              <a:buSzTx/>
-              <a:buFontTx/>
-              <a:buNone/>
-              <a:tabLst/>
-              <a:defRPr/>
-            </a:pPr>
             <a:r>
               <a:rPr lang="en-US" dirty="0"/>
-              <a:t>T101389-s1-04-manifest-report-stored-in-discover</a:t>
+              <a:t>T101389-s1-exporttomanifest</a:t>
             </a:r>
           </a:p>
         </p:txBody>
@@ -1878,7 +2087,7 @@
           <a:p>
             <a:fld id="{7FE50167-558C-4D4E-A218-0F44CB45BE81}" type="slidenum">
               <a:rPr lang="en-US" smtClean="0"/>
-              <a:t>18</a:t>
+              <a:t>17</a:t>
             </a:fld>
             <a:endParaRPr lang="en-US"/>
           </a:p>
@@ -1887,7 +2096,7 @@
     </p:spTree>
     <p:extLst>
       <p:ext uri="{BB962C8B-B14F-4D97-AF65-F5344CB8AC3E}">
-        <p14:creationId xmlns:p14="http://schemas.microsoft.com/office/powerpoint/2010/main" val="2515915617"/>
+        <p14:creationId xmlns:p14="http://schemas.microsoft.com/office/powerpoint/2010/main" val="520174725"/>
       </p:ext>
     </p:extLst>
   </p:cSld>
@@ -6062,10 +6271,10 @@
       </p:grpSpPr>
       <p:pic>
         <p:nvPicPr>
-          <p:cNvPr id="4" name="Picture 3">
-            <a:extLst>
-              <a:ext uri="{FF2B5EF4-FFF2-40B4-BE49-F238E27FC236}">
-                <a16:creationId xmlns:a16="http://schemas.microsoft.com/office/drawing/2014/main" id="{7C3ED1B3-18A3-4E78-B36D-A8F376340E08}"/>
+          <p:cNvPr id="3" name="Picture 2">
+            <a:extLst>
+              <a:ext uri="{FF2B5EF4-FFF2-40B4-BE49-F238E27FC236}">
+                <a16:creationId xmlns:a16="http://schemas.microsoft.com/office/drawing/2014/main" id="{B00042E5-4EE4-4366-BC7E-6602F9B6740E}"/>
               </a:ext>
             </a:extLst>
           </p:cNvPr>
@@ -6082,8 +6291,8 @@
         </p:blipFill>
         <p:spPr>
           <a:xfrm>
-            <a:off x="0" y="703504"/>
-            <a:ext cx="12192000" cy="4954346"/>
+            <a:off x="0" y="286255"/>
+            <a:ext cx="12192000" cy="6285489"/>
           </a:xfrm>
           <a:prstGeom prst="rect">
             <a:avLst/>
@@ -6104,8 +6313,8 @@
         </p:nvSpPr>
         <p:spPr>
           <a:xfrm>
-            <a:off x="3162300" y="1533526"/>
-            <a:ext cx="409575" cy="3848100"/>
+            <a:off x="3290119" y="1248391"/>
+            <a:ext cx="357649" cy="4877106"/>
           </a:xfrm>
           <a:prstGeom prst="rect">
             <a:avLst/>
@@ -6156,7 +6365,7 @@
         </p:nvSpPr>
         <p:spPr>
           <a:xfrm rot="5400000">
-            <a:off x="9766148" y="745068"/>
+            <a:off x="9785812" y="400940"/>
             <a:ext cx="374073" cy="290946"/>
           </a:xfrm>
           <a:prstGeom prst="rightArrow">
@@ -6226,6 +6435,66 @@
       </p:grpSpPr>
       <p:pic>
         <p:nvPicPr>
+          <p:cNvPr id="7" name="Picture 6">
+            <a:extLst>
+              <a:ext uri="{FF2B5EF4-FFF2-40B4-BE49-F238E27FC236}">
+                <a16:creationId xmlns:a16="http://schemas.microsoft.com/office/drawing/2014/main" id="{1E6E6311-A8A8-45BF-BA73-FA08AF19CC5D}"/>
+              </a:ext>
+            </a:extLst>
+          </p:cNvPr>
+          <p:cNvPicPr>
+            <a:picLocks noChangeAspect="1"/>
+          </p:cNvPicPr>
+          <p:nvPr/>
+        </p:nvPicPr>
+        <p:blipFill>
+          <a:blip r:embed="rId3"/>
+          <a:stretch>
+            <a:fillRect/>
+          </a:stretch>
+        </p:blipFill>
+        <p:spPr>
+          <a:xfrm>
+            <a:off x="0" y="299113"/>
+            <a:ext cx="12192000" cy="6259774"/>
+          </a:xfrm>
+          <a:prstGeom prst="rect">
+            <a:avLst/>
+          </a:prstGeom>
+        </p:spPr>
+      </p:pic>
+    </p:spTree>
+    <p:extLst>
+      <p:ext uri="{BB962C8B-B14F-4D97-AF65-F5344CB8AC3E}">
+        <p14:creationId xmlns:p14="http://schemas.microsoft.com/office/powerpoint/2010/main" val="1579999938"/>
+      </p:ext>
+    </p:extLst>
+  </p:cSld>
+  <p:clrMapOvr>
+    <a:masterClrMapping/>
+  </p:clrMapOvr>
+</p:sld>
+</file>
+
+<file path=ppt/slides/slide16.xml><?xml version="1.0" encoding="utf-8"?>
+<p:sld xmlns:a="http://schemas.openxmlformats.org/drawingml/2006/main" xmlns:r="http://schemas.openxmlformats.org/officeDocument/2006/relationships" xmlns:p="http://schemas.openxmlformats.org/presentationml/2006/main">
+  <p:cSld>
+    <p:spTree>
+      <p:nvGrpSpPr>
+        <p:cNvPr id="1" name=""/>
+        <p:cNvGrpSpPr/>
+        <p:nvPr/>
+      </p:nvGrpSpPr>
+      <p:grpSpPr>
+        <a:xfrm>
+          <a:off x="0" y="0"/>
+          <a:ext cx="0" cy="0"/>
+          <a:chOff x="0" y="0"/>
+          <a:chExt cx="0" cy="0"/>
+        </a:xfrm>
+      </p:grpSpPr>
+      <p:pic>
+        <p:nvPicPr>
           <p:cNvPr id="6" name="Picture 5">
             <a:extLst>
               <a:ext uri="{FF2B5EF4-FFF2-40B4-BE49-F238E27FC236}">
@@ -6371,7 +6640,7 @@
 </p:sld>
 </file>
 
-<file path=ppt/slides/slide16.xml><?xml version="1.0" encoding="utf-8"?>
+<file path=ppt/slides/slide17.xml><?xml version="1.0" encoding="utf-8"?>
 <p:sld xmlns:a="http://schemas.openxmlformats.org/drawingml/2006/main" xmlns:r="http://schemas.openxmlformats.org/officeDocument/2006/relationships" xmlns:p="http://schemas.openxmlformats.org/presentationml/2006/main">
   <p:cSld>
     <p:spTree>
@@ -6483,7 +6752,7 @@
 </p:sld>
 </file>
 
-<file path=ppt/slides/slide17.xml><?xml version="1.0" encoding="utf-8"?>
+<file path=ppt/slides/slide18.xml><?xml version="1.0" encoding="utf-8"?>
 <p:sld xmlns:a="http://schemas.openxmlformats.org/drawingml/2006/main" xmlns:r="http://schemas.openxmlformats.org/officeDocument/2006/relationships" xmlns:p="http://schemas.openxmlformats.org/presentationml/2006/main">
   <p:cSld>
     <p:spTree>
@@ -6595,7 +6864,7 @@
 </p:sld>
 </file>
 
-<file path=ppt/slides/slide18.xml><?xml version="1.0" encoding="utf-8"?>
+<file path=ppt/slides/slide19.xml><?xml version="1.0" encoding="utf-8"?>
 <p:sld xmlns:a="http://schemas.openxmlformats.org/drawingml/2006/main" xmlns:r="http://schemas.openxmlformats.org/officeDocument/2006/relationships" xmlns:p="http://schemas.openxmlformats.org/presentationml/2006/main">
   <p:cSld>
     <p:spTree>
@@ -6707,7 +6976,79 @@
 </p:sld>
 </file>
 
-<file path=ppt/slides/slide19.xml><?xml version="1.0" encoding="utf-8"?>
+<file path=ppt/slides/slide2.xml><?xml version="1.0" encoding="utf-8"?>
+<p:sld xmlns:a="http://schemas.openxmlformats.org/drawingml/2006/main" xmlns:r="http://schemas.openxmlformats.org/officeDocument/2006/relationships" xmlns:p="http://schemas.openxmlformats.org/presentationml/2006/main">
+  <p:cSld>
+    <p:spTree>
+      <p:nvGrpSpPr>
+        <p:cNvPr id="1" name=""/>
+        <p:cNvGrpSpPr/>
+        <p:nvPr/>
+      </p:nvGrpSpPr>
+      <p:grpSpPr>
+        <a:xfrm>
+          <a:off x="0" y="0"/>
+          <a:ext cx="0" cy="0"/>
+          <a:chOff x="0" y="0"/>
+          <a:chExt cx="0" cy="0"/>
+        </a:xfrm>
+      </p:grpSpPr>
+      <p:sp>
+        <p:nvSpPr>
+          <p:cNvPr id="2" name="Title 1">
+            <a:extLst>
+              <a:ext uri="{FF2B5EF4-FFF2-40B4-BE49-F238E27FC236}">
+                <a16:creationId xmlns:a16="http://schemas.microsoft.com/office/drawing/2014/main" id="{E44F8F50-F463-4161-8FE4-2C8AD24AF0A4}"/>
+              </a:ext>
+            </a:extLst>
+          </p:cNvPr>
+          <p:cNvSpPr>
+            <a:spLocks noGrp="1"/>
+          </p:cNvSpPr>
+          <p:nvPr>
+            <p:ph type="title"/>
+          </p:nvPr>
+        </p:nvSpPr>
+        <p:spPr>
+          <a:xfrm>
+            <a:off x="720213" y="3039845"/>
+            <a:ext cx="10515600" cy="778310"/>
+          </a:xfrm>
+        </p:spPr>
+        <p:txBody>
+          <a:bodyPr>
+            <a:normAutofit/>
+          </a:bodyPr>
+          <a:lstStyle/>
+          <a:p>
+            <a:pPr algn="l"/>
+            <a:r>
+              <a:rPr lang="en-US" sz="2800" b="1" i="0" dirty="0">
+                <a:solidFill>
+                  <a:srgbClr val="24292F"/>
+                </a:solidFill>
+                <a:effectLst/>
+                <a:latin typeface="-apple-system"/>
+              </a:rPr>
+              <a:t>1. Set up Spectrum Discover to Manage Data Sources</a:t>
+            </a:r>
+          </a:p>
+        </p:txBody>
+      </p:sp>
+    </p:spTree>
+    <p:extLst>
+      <p:ext uri="{BB962C8B-B14F-4D97-AF65-F5344CB8AC3E}">
+        <p14:creationId xmlns:p14="http://schemas.microsoft.com/office/powerpoint/2010/main" val="2028958019"/>
+      </p:ext>
+    </p:extLst>
+  </p:cSld>
+  <p:clrMapOvr>
+    <a:masterClrMapping/>
+  </p:clrMapOvr>
+</p:sld>
+</file>
+
+<file path=ppt/slides/slide20.xml><?xml version="1.0" encoding="utf-8"?>
 <p:sld xmlns:a="http://schemas.openxmlformats.org/drawingml/2006/main" xmlns:r="http://schemas.openxmlformats.org/officeDocument/2006/relationships" xmlns:p="http://schemas.openxmlformats.org/presentationml/2006/main">
   <p:cSld>
     <p:spTree>
@@ -6823,7 +7164,7 @@
 </p:sld>
 </file>
 
-<file path=ppt/slides/slide2.xml><?xml version="1.0" encoding="utf-8"?>
+<file path=ppt/slides/slide21.xml><?xml version="1.0" encoding="utf-8"?>
 <p:sld xmlns:a="http://schemas.openxmlformats.org/drawingml/2006/main" xmlns:r="http://schemas.openxmlformats.org/officeDocument/2006/relationships" xmlns:p="http://schemas.openxmlformats.org/presentationml/2006/main">
   <p:cSld>
     <p:spTree>
@@ -6842,78 +7183,6 @@
       </p:grpSpPr>
       <p:sp>
         <p:nvSpPr>
-          <p:cNvPr id="2" name="Title 1">
-            <a:extLst>
-              <a:ext uri="{FF2B5EF4-FFF2-40B4-BE49-F238E27FC236}">
-                <a16:creationId xmlns:a16="http://schemas.microsoft.com/office/drawing/2014/main" id="{E44F8F50-F463-4161-8FE4-2C8AD24AF0A4}"/>
-              </a:ext>
-            </a:extLst>
-          </p:cNvPr>
-          <p:cNvSpPr>
-            <a:spLocks noGrp="1"/>
-          </p:cNvSpPr>
-          <p:nvPr>
-            <p:ph type="title"/>
-          </p:nvPr>
-        </p:nvSpPr>
-        <p:spPr>
-          <a:xfrm>
-            <a:off x="720213" y="3039845"/>
-            <a:ext cx="10515600" cy="778310"/>
-          </a:xfrm>
-        </p:spPr>
-        <p:txBody>
-          <a:bodyPr>
-            <a:normAutofit/>
-          </a:bodyPr>
-          <a:lstStyle/>
-          <a:p>
-            <a:pPr algn="l"/>
-            <a:r>
-              <a:rPr lang="en-US" sz="2800" b="1" i="0" dirty="0">
-                <a:solidFill>
-                  <a:srgbClr val="24292F"/>
-                </a:solidFill>
-                <a:effectLst/>
-                <a:latin typeface="-apple-system"/>
-              </a:rPr>
-              <a:t>1. Set up Spectrum Discover to Manage Data Sources</a:t>
-            </a:r>
-          </a:p>
-        </p:txBody>
-      </p:sp>
-    </p:spTree>
-    <p:extLst>
-      <p:ext uri="{BB962C8B-B14F-4D97-AF65-F5344CB8AC3E}">
-        <p14:creationId xmlns:p14="http://schemas.microsoft.com/office/powerpoint/2010/main" val="2028958019"/>
-      </p:ext>
-    </p:extLst>
-  </p:cSld>
-  <p:clrMapOvr>
-    <a:masterClrMapping/>
-  </p:clrMapOvr>
-</p:sld>
-</file>
-
-<file path=ppt/slides/slide20.xml><?xml version="1.0" encoding="utf-8"?>
-<p:sld xmlns:a="http://schemas.openxmlformats.org/drawingml/2006/main" xmlns:r="http://schemas.openxmlformats.org/officeDocument/2006/relationships" xmlns:p="http://schemas.openxmlformats.org/presentationml/2006/main">
-  <p:cSld>
-    <p:spTree>
-      <p:nvGrpSpPr>
-        <p:cNvPr id="1" name=""/>
-        <p:cNvGrpSpPr/>
-        <p:nvPr/>
-      </p:nvGrpSpPr>
-      <p:grpSpPr>
-        <a:xfrm>
-          <a:off x="0" y="0"/>
-          <a:ext cx="0" cy="0"/>
-          <a:chOff x="0" y="0"/>
-          <a:chExt cx="0" cy="0"/>
-        </a:xfrm>
-      </p:grpSpPr>
-      <p:sp>
-        <p:nvSpPr>
           <p:cNvPr id="5" name="Title 1">
             <a:extLst>
               <a:ext uri="{FF2B5EF4-FFF2-40B4-BE49-F238E27FC236}">
@@ -7005,7 +7274,7 @@
 </p:sld>
 </file>
 
-<file path=ppt/slides/slide21.xml><?xml version="1.0" encoding="utf-8"?>
+<file path=ppt/slides/slide22.xml><?xml version="1.0" encoding="utf-8"?>
 <p:sld xmlns:a="http://schemas.openxmlformats.org/drawingml/2006/main" xmlns:r="http://schemas.openxmlformats.org/officeDocument/2006/relationships" xmlns:p="http://schemas.openxmlformats.org/presentationml/2006/main">
   <p:cSld>
     <p:spTree>
@@ -7146,7 +7415,7 @@
 </p:sld>
 </file>
 
-<file path=ppt/slides/slide22.xml><?xml version="1.0" encoding="utf-8"?>
+<file path=ppt/slides/slide23.xml><?xml version="1.0" encoding="utf-8"?>
 <p:sld xmlns:a="http://schemas.openxmlformats.org/drawingml/2006/main" xmlns:r="http://schemas.openxmlformats.org/officeDocument/2006/relationships" xmlns:p="http://schemas.openxmlformats.org/presentationml/2006/main">
   <p:cSld>
     <p:spTree>
@@ -7287,7 +7556,7 @@
 </p:sld>
 </file>
 
-<file path=ppt/slides/slide23.xml><?xml version="1.0" encoding="utf-8"?>
+<file path=ppt/slides/slide24.xml><?xml version="1.0" encoding="utf-8"?>
 <p:sld xmlns:a="http://schemas.openxmlformats.org/drawingml/2006/main" xmlns:r="http://schemas.openxmlformats.org/officeDocument/2006/relationships" xmlns:p="http://schemas.openxmlformats.org/presentationml/2006/main">
   <p:cSld>
     <p:spTree>
@@ -7347,7 +7616,7 @@
 </p:sld>
 </file>
 
-<file path=ppt/slides/slide24.xml><?xml version="1.0" encoding="utf-8"?>
+<file path=ppt/slides/slide25.xml><?xml version="1.0" encoding="utf-8"?>
 <p:sld xmlns:a="http://schemas.openxmlformats.org/drawingml/2006/main" xmlns:r="http://schemas.openxmlformats.org/officeDocument/2006/relationships" xmlns:p="http://schemas.openxmlformats.org/presentationml/2006/main">
   <p:cSld>
     <p:spTree>
@@ -7488,7 +7757,7 @@
 </p:sld>
 </file>
 
-<file path=ppt/slides/slide25.xml><?xml version="1.0" encoding="utf-8"?>
+<file path=ppt/slides/slide26.xml><?xml version="1.0" encoding="utf-8"?>
 <p:sld xmlns:a="http://schemas.openxmlformats.org/drawingml/2006/main" xmlns:r="http://schemas.openxmlformats.org/officeDocument/2006/relationships" xmlns:p="http://schemas.openxmlformats.org/presentationml/2006/main">
   <p:cSld>
     <p:spTree>
@@ -7579,7 +7848,7 @@
 </p:sld>
 </file>
 
-<file path=ppt/slides/slide26.xml><?xml version="1.0" encoding="utf-8"?>
+<file path=ppt/slides/slide27.xml><?xml version="1.0" encoding="utf-8"?>
 <p:sld xmlns:a="http://schemas.openxmlformats.org/drawingml/2006/main" xmlns:r="http://schemas.openxmlformats.org/officeDocument/2006/relationships" xmlns:p="http://schemas.openxmlformats.org/presentationml/2006/main">
   <p:cSld>
     <p:spTree>
@@ -7795,7 +8064,7 @@
 </p:sld>
 </file>
 
-<file path=ppt/slides/slide27.xml><?xml version="1.0" encoding="utf-8"?>
+<file path=ppt/slides/slide28.xml><?xml version="1.0" encoding="utf-8"?>
 <p:sld xmlns:a="http://schemas.openxmlformats.org/drawingml/2006/main" xmlns:r="http://schemas.openxmlformats.org/officeDocument/2006/relationships" xmlns:p="http://schemas.openxmlformats.org/presentationml/2006/main">
   <p:cSld>
     <p:spTree>

</xml_diff>